<commit_message>
Add 2 tables of the Result in ppt
</commit_message>
<xml_diff>
--- a/MySEProject/Documentation/ppt for video learing migration project from Codebreakers.pptx
+++ b/MySEProject/Documentation/ppt for video learing migration project from Codebreakers.pptx
@@ -5,10 +5,10 @@
     <p:sldMasterId id="2147483684" r:id="rId4"/>
   </p:sldMasterIdLst>
   <p:notesMasterIdLst>
-    <p:notesMasterId r:id="rId27"/>
+    <p:notesMasterId r:id="rId28"/>
   </p:notesMasterIdLst>
   <p:handoutMasterIdLst>
-    <p:handoutMasterId r:id="rId28"/>
+    <p:handoutMasterId r:id="rId29"/>
   </p:handoutMasterIdLst>
   <p:sldIdLst>
     <p:sldId id="256" r:id="rId5"/>
@@ -32,7 +32,8 @@
     <p:sldId id="283" r:id="rId23"/>
     <p:sldId id="284" r:id="rId24"/>
     <p:sldId id="285" r:id="rId25"/>
-    <p:sldId id="286" r:id="rId26"/>
+    <p:sldId id="287" r:id="rId26"/>
+    <p:sldId id="286" r:id="rId27"/>
   </p:sldIdLst>
   <p:sldSz cx="12192000" cy="6858000"/>
   <p:notesSz cx="6858000" cy="9144000"/>
@@ -9456,7 +9457,13 @@
           </a:p>
           <a:p>
             <a:pPr algn="l"/>
-            <a:endParaRPr lang="en-US" sz="2000" dirty="0"/>
+            <a:r>
+              <a:rPr lang="en-US" sz="2000" b="1" dirty="0">
+                <a:latin typeface="Times New Roman" panose="02020603050405020304" pitchFamily="18" charset="0"/>
+                <a:ea typeface="SimSun" panose="02010600030101010101" pitchFamily="2" charset="-122"/>
+              </a:rPr>
+              <a:t>Group Name : Code Breakers</a:t>
+            </a:r>
           </a:p>
           <a:p>
             <a:pPr algn="l"/>
@@ -11460,77 +11467,6 @@
             <a:r>
               <a:rPr lang="en-US" dirty="0"/>
               <a:t>CONCLUSION</a:t>
-            </a:r>
-          </a:p>
-        </p:txBody>
-      </p:sp>
-      <p:sp>
-        <p:nvSpPr>
-          <p:cNvPr id="3" name="Text Placeholder 2">
-            <a:extLst>
-              <a:ext uri="{FF2B5EF4-FFF2-40B4-BE49-F238E27FC236}">
-                <a16:creationId xmlns:a16="http://schemas.microsoft.com/office/drawing/2014/main" id="{01586E83-5E60-4583-AD9D-A31CE379D77C}"/>
-              </a:ext>
-            </a:extLst>
-          </p:cNvPr>
-          <p:cNvSpPr>
-            <a:spLocks noGrp="1"/>
-          </p:cNvSpPr>
-          <p:nvPr>
-            <p:ph type="body" sz="quarter" idx="15"/>
-          </p:nvPr>
-        </p:nvSpPr>
-        <p:spPr>
-          <a:xfrm>
-            <a:off x="-1" y="4710314"/>
-            <a:ext cx="8162925" cy="2072213"/>
-          </a:xfrm>
-        </p:spPr>
-        <p:txBody>
-          <a:bodyPr/>
-          <a:lstStyle/>
-          <a:p>
-            <a:r>
-              <a:rPr lang="en-US" dirty="0"/>
-              <a:t>Limitations</a:t>
-            </a:r>
-          </a:p>
-          <a:p>
-            <a:pPr marL="285750" indent="-285750" algn="l">
-              <a:buFont typeface="Wingdings" panose="05000000000000000000" pitchFamily="2" charset="2"/>
-              <a:buChar char="q"/>
-            </a:pPr>
-            <a:r>
-              <a:rPr lang="en-US" sz="1400" dirty="0"/>
-              <a:t>The prediction for user input image is given mostly from the last learned video set</a:t>
-            </a:r>
-          </a:p>
-          <a:p>
-            <a:pPr marL="285750" indent="-285750" algn="l">
-              <a:buFont typeface="Wingdings" panose="05000000000000000000" pitchFamily="2" charset="2"/>
-              <a:buChar char="q"/>
-            </a:pPr>
-            <a:r>
-              <a:rPr lang="en-US" sz="1400" dirty="0"/>
-              <a:t>Better video codec format should be implemented</a:t>
-            </a:r>
-          </a:p>
-          <a:p>
-            <a:pPr marL="285750" indent="-285750" algn="l">
-              <a:buFont typeface="Wingdings" panose="05000000000000000000" pitchFamily="2" charset="2"/>
-              <a:buChar char="q"/>
-            </a:pPr>
-            <a:r>
-              <a:rPr lang="en-US" sz="1400" dirty="0"/>
-              <a:t>Drawing from encoded bit array should be better and OS independent like </a:t>
-            </a:r>
-            <a:r>
-              <a:rPr lang="en-US" sz="1400" dirty="0" err="1"/>
-              <a:t>SkiaSharp</a:t>
-            </a:r>
-            <a:r>
-              <a:rPr lang="en-US" sz="1400" dirty="0"/>
-              <a:t> Library</a:t>
             </a:r>
           </a:p>
         </p:txBody>
@@ -12612,7 +12548,7 @@
           <p:nvPr>
             <p:extLst>
               <p:ext uri="{D42A27DB-BD31-4B8C-83A1-F6EECF244321}">
-                <p14:modId xmlns:p14="http://schemas.microsoft.com/office/powerpoint/2010/main" val="1001444974"/>
+                <p14:modId xmlns:p14="http://schemas.microsoft.com/office/powerpoint/2010/main" val="3050225058"/>
               </p:ext>
             </p:extLst>
           </p:nvPr>
@@ -13673,6 +13609,3052 @@
 </file>
 
 <file path=ppt/slides/slide22.xml><?xml version="1.0" encoding="utf-8"?>
+<p:sld xmlns:a="http://schemas.openxmlformats.org/drawingml/2006/main" xmlns:r="http://schemas.openxmlformats.org/officeDocument/2006/relationships" xmlns:p="http://schemas.openxmlformats.org/presentationml/2006/main">
+  <p:cSld>
+    <p:spTree>
+      <p:nvGrpSpPr>
+        <p:cNvPr id="1" name=""/>
+        <p:cNvGrpSpPr/>
+        <p:nvPr/>
+      </p:nvGrpSpPr>
+      <p:grpSpPr>
+        <a:xfrm>
+          <a:off x="0" y="0"/>
+          <a:ext cx="0" cy="0"/>
+          <a:chOff x="0" y="0"/>
+          <a:chExt cx="0" cy="0"/>
+        </a:xfrm>
+      </p:grpSpPr>
+      <p:sp>
+        <p:nvSpPr>
+          <p:cNvPr id="2" name="Title 1">
+            <a:extLst>
+              <a:ext uri="{FF2B5EF4-FFF2-40B4-BE49-F238E27FC236}">
+                <a16:creationId xmlns:a16="http://schemas.microsoft.com/office/drawing/2014/main" id="{5D65BC15-8CBD-44FF-94D3-77CA1D3E91C9}"/>
+              </a:ext>
+            </a:extLst>
+          </p:cNvPr>
+          <p:cNvSpPr>
+            <a:spLocks noGrp="1"/>
+          </p:cNvSpPr>
+          <p:nvPr>
+            <p:ph type="ctrTitle"/>
+          </p:nvPr>
+        </p:nvSpPr>
+        <p:spPr>
+          <a:xfrm>
+            <a:off x="0" y="1"/>
+            <a:ext cx="9144000" cy="595176"/>
+          </a:xfrm>
+        </p:spPr>
+        <p:txBody>
+          <a:bodyPr>
+            <a:normAutofit fontScale="90000"/>
+          </a:bodyPr>
+          <a:lstStyle/>
+          <a:p>
+            <a:r>
+              <a:rPr lang="en-US" dirty="0"/>
+              <a:t>     CONCLUSION</a:t>
+            </a:r>
+          </a:p>
+        </p:txBody>
+      </p:sp>
+      <p:sp>
+        <p:nvSpPr>
+          <p:cNvPr id="3" name="Text Placeholder 2">
+            <a:extLst>
+              <a:ext uri="{FF2B5EF4-FFF2-40B4-BE49-F238E27FC236}">
+                <a16:creationId xmlns:a16="http://schemas.microsoft.com/office/drawing/2014/main" id="{01586E83-5E60-4583-AD9D-A31CE379D77C}"/>
+              </a:ext>
+            </a:extLst>
+          </p:cNvPr>
+          <p:cNvSpPr>
+            <a:spLocks noGrp="1"/>
+          </p:cNvSpPr>
+          <p:nvPr>
+            <p:ph type="body" sz="quarter" idx="15"/>
+          </p:nvPr>
+        </p:nvSpPr>
+        <p:spPr>
+          <a:xfrm>
+            <a:off x="566943" y="5009087"/>
+            <a:ext cx="8162925" cy="2072213"/>
+          </a:xfrm>
+        </p:spPr>
+        <p:txBody>
+          <a:bodyPr/>
+          <a:lstStyle/>
+          <a:p>
+            <a:r>
+              <a:rPr lang="en-US" dirty="0"/>
+              <a:t>Limitations</a:t>
+            </a:r>
+          </a:p>
+          <a:p>
+            <a:pPr marL="285750" indent="-285750" algn="l">
+              <a:buFont typeface="Wingdings" panose="05000000000000000000" pitchFamily="2" charset="2"/>
+              <a:buChar char="q"/>
+            </a:pPr>
+            <a:r>
+              <a:rPr lang="en-US" sz="1400" dirty="0"/>
+              <a:t>The prediction for user input image is given mostly from the last learned video set</a:t>
+            </a:r>
+          </a:p>
+          <a:p>
+            <a:pPr marL="285750" indent="-285750" algn="l">
+              <a:buFont typeface="Wingdings" panose="05000000000000000000" pitchFamily="2" charset="2"/>
+              <a:buChar char="q"/>
+            </a:pPr>
+            <a:r>
+              <a:rPr lang="en-US" sz="1400" dirty="0"/>
+              <a:t>Better video codec format should be implemented</a:t>
+            </a:r>
+          </a:p>
+          <a:p>
+            <a:pPr marL="285750" indent="-285750" algn="l">
+              <a:buFont typeface="Wingdings" panose="05000000000000000000" pitchFamily="2" charset="2"/>
+              <a:buChar char="q"/>
+            </a:pPr>
+            <a:r>
+              <a:rPr lang="en-US" sz="1400" dirty="0"/>
+              <a:t>Drawing from encoded bit array should be better and OS independent like </a:t>
+            </a:r>
+            <a:r>
+              <a:rPr lang="en-US" sz="1400" dirty="0" err="1"/>
+              <a:t>SkiaSharp</a:t>
+            </a:r>
+            <a:r>
+              <a:rPr lang="en-US" sz="1400" dirty="0"/>
+              <a:t> Library</a:t>
+            </a:r>
+          </a:p>
+        </p:txBody>
+      </p:sp>
+      <p:graphicFrame>
+        <p:nvGraphicFramePr>
+          <p:cNvPr id="7" name="Table 6">
+            <a:extLst>
+              <a:ext uri="{FF2B5EF4-FFF2-40B4-BE49-F238E27FC236}">
+                <a16:creationId xmlns:a16="http://schemas.microsoft.com/office/drawing/2014/main" id="{58670A29-53CF-417E-86D2-D605C18A3882}"/>
+              </a:ext>
+            </a:extLst>
+          </p:cNvPr>
+          <p:cNvGraphicFramePr>
+            <a:graphicFrameLocks noGrp="1"/>
+          </p:cNvGraphicFramePr>
+          <p:nvPr>
+            <p:extLst>
+              <p:ext uri="{D42A27DB-BD31-4B8C-83A1-F6EECF244321}">
+                <p14:modId xmlns:p14="http://schemas.microsoft.com/office/powerpoint/2010/main" val="4074546065"/>
+              </p:ext>
+            </p:extLst>
+          </p:nvPr>
+        </p:nvGraphicFramePr>
+        <p:xfrm>
+          <a:off x="566943" y="595176"/>
+          <a:ext cx="2637299" cy="4433458"/>
+        </p:xfrm>
+        <a:graphic>
+          <a:graphicData uri="http://schemas.openxmlformats.org/drawingml/2006/table">
+            <a:tbl>
+              <a:tblPr firstRow="1" firstCol="1" bandRow="1">
+                <a:tableStyleId>{5C22544A-7EE6-4342-B048-85BDC9FD1C3A}</a:tableStyleId>
+              </a:tblPr>
+              <a:tblGrid>
+                <a:gridCol w="1307435">
+                  <a:extLst>
+                    <a:ext uri="{9D8B030D-6E8A-4147-A177-3AD203B41FA5}">
+                      <a16:colId xmlns:a16="http://schemas.microsoft.com/office/drawing/2014/main" val="3531255076"/>
+                    </a:ext>
+                  </a:extLst>
+                </a:gridCol>
+                <a:gridCol w="1329864">
+                  <a:extLst>
+                    <a:ext uri="{9D8B030D-6E8A-4147-A177-3AD203B41FA5}">
+                      <a16:colId xmlns:a16="http://schemas.microsoft.com/office/drawing/2014/main" val="3711428818"/>
+                    </a:ext>
+                  </a:extLst>
+                </a:gridCol>
+              </a:tblGrid>
+              <a:tr h="106807">
+                <a:tc>
+                  <a:txBody>
+                    <a:bodyPr/>
+                    <a:lstStyle/>
+                    <a:p>
+                      <a:pPr marL="0" marR="0" algn="just">
+                        <a:lnSpc>
+                          <a:spcPct val="107000"/>
+                        </a:lnSpc>
+                        <a:spcBef>
+                          <a:spcPts val="0"/>
+                        </a:spcBef>
+                        <a:spcAft>
+                          <a:spcPts val="0"/>
+                        </a:spcAft>
+                      </a:pPr>
+                      <a:r>
+                        <a:rPr lang="en-US" sz="400">
+                          <a:effectLst/>
+                        </a:rPr>
+                        <a:t>Input Picture Sequence</a:t>
+                      </a:r>
+                      <a:endParaRPr lang="en-US" sz="400">
+                        <a:effectLst/>
+                        <a:latin typeface="Times New Roman" panose="02020603050405020304" pitchFamily="18" charset="0"/>
+                        <a:ea typeface="SimSun" panose="02010600030101010101" pitchFamily="2" charset="-122"/>
+                        <a:cs typeface="Times New Roman" panose="02020603050405020304" pitchFamily="18" charset="0"/>
+                      </a:endParaRPr>
+                    </a:p>
+                  </a:txBody>
+                  <a:tcPr marL="24955" marR="24955" marT="0" marB="0"/>
+                </a:tc>
+                <a:tc>
+                  <a:txBody>
+                    <a:bodyPr/>
+                    <a:lstStyle/>
+                    <a:p>
+                      <a:pPr marL="0" marR="0" algn="just">
+                        <a:lnSpc>
+                          <a:spcPct val="107000"/>
+                        </a:lnSpc>
+                        <a:spcBef>
+                          <a:spcPts val="0"/>
+                        </a:spcBef>
+                        <a:spcAft>
+                          <a:spcPts val="0"/>
+                        </a:spcAft>
+                      </a:pPr>
+                      <a:r>
+                        <a:rPr lang="en-US" sz="400">
+                          <a:effectLst/>
+                        </a:rPr>
+                        <a:t>Possible Matches Found </a:t>
+                      </a:r>
+                      <a:endParaRPr lang="en-US" sz="400">
+                        <a:effectLst/>
+                        <a:latin typeface="Times New Roman" panose="02020603050405020304" pitchFamily="18" charset="0"/>
+                        <a:ea typeface="SimSun" panose="02010600030101010101" pitchFamily="2" charset="-122"/>
+                        <a:cs typeface="Times New Roman" panose="02020603050405020304" pitchFamily="18" charset="0"/>
+                      </a:endParaRPr>
+                    </a:p>
+                  </a:txBody>
+                  <a:tcPr marL="24955" marR="24955" marT="0" marB="0"/>
+                </a:tc>
+                <a:extLst>
+                  <a:ext uri="{0D108BD9-81ED-4DB2-BD59-A6C34878D82A}">
+                    <a16:rowId xmlns:a16="http://schemas.microsoft.com/office/drawing/2014/main" val="173792572"/>
+                  </a:ext>
+                </a:extLst>
+              </a:tr>
+              <a:tr h="546892">
+                <a:tc>
+                  <a:txBody>
+                    <a:bodyPr/>
+                    <a:lstStyle/>
+                    <a:p>
+                      <a:pPr marL="0" marR="0" algn="just">
+                        <a:lnSpc>
+                          <a:spcPct val="107000"/>
+                        </a:lnSpc>
+                        <a:spcBef>
+                          <a:spcPts val="0"/>
+                        </a:spcBef>
+                        <a:spcAft>
+                          <a:spcPts val="0"/>
+                        </a:spcAft>
+                      </a:pPr>
+                      <a:r>
+                        <a:rPr lang="en-US" sz="800" u="none" strike="noStrike" dirty="0">
+                          <a:solidFill>
+                            <a:schemeClr val="accent5">
+                              <a:lumMod val="75000"/>
+                            </a:schemeClr>
+                          </a:solidFill>
+                          <a:effectLst/>
+                          <a:hlinkClick r:id="rId2">
+                            <a:extLst>
+                              <a:ext uri="{A12FA001-AC4F-418D-AE19-62706E023703}">
+                                <ahyp:hlinkClr xmlns:ahyp="http://schemas.microsoft.com/office/drawing/2018/hyperlinkcolor" val="tx"/>
+                              </a:ext>
+                            </a:extLst>
+                          </a:hlinkClick>
+                        </a:rPr>
+                        <a:t>Circle_circle_2.png</a:t>
+                      </a:r>
+                      <a:r>
+                        <a:rPr lang="en-US" sz="800" dirty="0">
+                          <a:solidFill>
+                            <a:schemeClr val="accent5">
+                              <a:lumMod val="75000"/>
+                            </a:schemeClr>
+                          </a:solidFill>
+                          <a:effectLst/>
+                        </a:rPr>
+                        <a:t> </a:t>
+                      </a:r>
+                      <a:endParaRPr lang="en-US" sz="800" dirty="0">
+                        <a:solidFill>
+                          <a:schemeClr val="accent5">
+                            <a:lumMod val="75000"/>
+                          </a:schemeClr>
+                        </a:solidFill>
+                        <a:effectLst/>
+                        <a:latin typeface="Times New Roman" panose="02020603050405020304" pitchFamily="18" charset="0"/>
+                        <a:ea typeface="SimSun" panose="02010600030101010101" pitchFamily="2" charset="-122"/>
+                        <a:cs typeface="Times New Roman" panose="02020603050405020304" pitchFamily="18" charset="0"/>
+                      </a:endParaRPr>
+                    </a:p>
+                  </a:txBody>
+                  <a:tcPr marL="24955" marR="24955" marT="0" marB="0"/>
+                </a:tc>
+                <a:tc>
+                  <a:txBody>
+                    <a:bodyPr/>
+                    <a:lstStyle/>
+                    <a:p>
+                      <a:pPr marL="0" marR="0" algn="just">
+                        <a:lnSpc>
+                          <a:spcPct val="107000"/>
+                        </a:lnSpc>
+                        <a:spcBef>
+                          <a:spcPts val="0"/>
+                        </a:spcBef>
+                        <a:spcAft>
+                          <a:spcPts val="0"/>
+                        </a:spcAft>
+                      </a:pPr>
+                      <a:r>
+                        <a:rPr lang="en-US" sz="500" dirty="0">
+                          <a:effectLst/>
+                        </a:rPr>
+                        <a:t>60.36% match with Triangle_19</a:t>
+                      </a:r>
+                    </a:p>
+                    <a:p>
+                      <a:pPr marL="0" marR="0" algn="just">
+                        <a:lnSpc>
+                          <a:spcPct val="107000"/>
+                        </a:lnSpc>
+                        <a:spcBef>
+                          <a:spcPts val="0"/>
+                        </a:spcBef>
+                        <a:spcAft>
+                          <a:spcPts val="0"/>
+                        </a:spcAft>
+                      </a:pPr>
+                      <a:r>
+                        <a:rPr lang="en-US" sz="500" dirty="0">
+                          <a:effectLst/>
+                        </a:rPr>
+                        <a:t>31.95% match with Triangle_27</a:t>
+                      </a:r>
+                    </a:p>
+                    <a:p>
+                      <a:pPr marL="0" marR="0" algn="just">
+                        <a:lnSpc>
+                          <a:spcPct val="107000"/>
+                        </a:lnSpc>
+                        <a:spcBef>
+                          <a:spcPts val="0"/>
+                        </a:spcBef>
+                        <a:spcAft>
+                          <a:spcPts val="0"/>
+                        </a:spcAft>
+                      </a:pPr>
+                      <a:r>
+                        <a:rPr lang="en-US" sz="500" dirty="0">
+                          <a:effectLst/>
+                        </a:rPr>
+                        <a:t>3.99% match with Circle_1</a:t>
+                      </a:r>
+                    </a:p>
+                    <a:p>
+                      <a:pPr marL="0" marR="0" algn="just">
+                        <a:lnSpc>
+                          <a:spcPct val="107000"/>
+                        </a:lnSpc>
+                        <a:spcBef>
+                          <a:spcPts val="0"/>
+                        </a:spcBef>
+                        <a:spcAft>
+                          <a:spcPts val="0"/>
+                        </a:spcAft>
+                      </a:pPr>
+                      <a:r>
+                        <a:rPr lang="en-US" sz="500" dirty="0">
+                          <a:effectLst/>
+                        </a:rPr>
+                        <a:t>3.55% match with Triangle_26</a:t>
+                      </a:r>
+                    </a:p>
+                    <a:p>
+                      <a:pPr marL="0" marR="0" algn="just">
+                        <a:lnSpc>
+                          <a:spcPct val="107000"/>
+                        </a:lnSpc>
+                        <a:spcBef>
+                          <a:spcPts val="0"/>
+                        </a:spcBef>
+                        <a:spcAft>
+                          <a:spcPts val="0"/>
+                        </a:spcAft>
+                      </a:pPr>
+                      <a:r>
+                        <a:rPr lang="en-US" sz="500" dirty="0">
+                          <a:effectLst/>
+                        </a:rPr>
+                        <a:t>3.43% match with Circle_4</a:t>
+                      </a:r>
+                      <a:endParaRPr lang="en-US" sz="500" dirty="0">
+                        <a:effectLst/>
+                        <a:latin typeface="Times New Roman" panose="02020603050405020304" pitchFamily="18" charset="0"/>
+                        <a:ea typeface="SimSun" panose="02010600030101010101" pitchFamily="2" charset="-122"/>
+                        <a:cs typeface="Times New Roman" panose="02020603050405020304" pitchFamily="18" charset="0"/>
+                      </a:endParaRPr>
+                    </a:p>
+                  </a:txBody>
+                  <a:tcPr marL="24955" marR="24955" marT="0" marB="0"/>
+                </a:tc>
+                <a:extLst>
+                  <a:ext uri="{0D108BD9-81ED-4DB2-BD59-A6C34878D82A}">
+                    <a16:rowId xmlns:a16="http://schemas.microsoft.com/office/drawing/2014/main" val="2698015494"/>
+                  </a:ext>
+                </a:extLst>
+              </a:tr>
+              <a:tr h="546892">
+                <a:tc>
+                  <a:txBody>
+                    <a:bodyPr/>
+                    <a:lstStyle/>
+                    <a:p>
+                      <a:pPr marL="0" marR="0" algn="just">
+                        <a:lnSpc>
+                          <a:spcPct val="107000"/>
+                        </a:lnSpc>
+                        <a:spcBef>
+                          <a:spcPts val="0"/>
+                        </a:spcBef>
+                        <a:spcAft>
+                          <a:spcPts val="0"/>
+                        </a:spcAft>
+                      </a:pPr>
+                      <a:r>
+                        <a:rPr lang="en-US" sz="800" u="none" strike="noStrike" dirty="0">
+                          <a:solidFill>
+                            <a:schemeClr val="accent5">
+                              <a:lumMod val="75000"/>
+                            </a:schemeClr>
+                          </a:solidFill>
+                          <a:effectLst/>
+                          <a:hlinkClick r:id="rId3">
+                            <a:extLst>
+                              <a:ext uri="{A12FA001-AC4F-418D-AE19-62706E023703}">
+                                <ahyp:hlinkClr xmlns:ahyp="http://schemas.microsoft.com/office/drawing/2018/hyperlinkcolor" val="tx"/>
+                              </a:ext>
+                            </a:extLst>
+                          </a:hlinkClick>
+                        </a:rPr>
+                        <a:t>Circle_circle_3.png</a:t>
+                      </a:r>
+                      <a:endParaRPr lang="en-US" sz="800" dirty="0">
+                        <a:solidFill>
+                          <a:schemeClr val="accent5">
+                            <a:lumMod val="75000"/>
+                          </a:schemeClr>
+                        </a:solidFill>
+                        <a:effectLst/>
+                        <a:latin typeface="Times New Roman" panose="02020603050405020304" pitchFamily="18" charset="0"/>
+                        <a:ea typeface="SimSun" panose="02010600030101010101" pitchFamily="2" charset="-122"/>
+                        <a:cs typeface="Times New Roman" panose="02020603050405020304" pitchFamily="18" charset="0"/>
+                      </a:endParaRPr>
+                    </a:p>
+                  </a:txBody>
+                  <a:tcPr marL="24955" marR="24955" marT="0" marB="0"/>
+                </a:tc>
+                <a:tc>
+                  <a:txBody>
+                    <a:bodyPr/>
+                    <a:lstStyle/>
+                    <a:p>
+                      <a:pPr marL="0" marR="0" algn="just">
+                        <a:lnSpc>
+                          <a:spcPct val="107000"/>
+                        </a:lnSpc>
+                        <a:spcBef>
+                          <a:spcPts val="0"/>
+                        </a:spcBef>
+                        <a:spcAft>
+                          <a:spcPts val="0"/>
+                        </a:spcAft>
+                      </a:pPr>
+                      <a:r>
+                        <a:rPr lang="en-US" sz="500">
+                          <a:effectLst/>
+                        </a:rPr>
+                        <a:t>10.45% match with Circle_1</a:t>
+                      </a:r>
+                    </a:p>
+                    <a:p>
+                      <a:pPr marL="0" marR="0" algn="just">
+                        <a:lnSpc>
+                          <a:spcPct val="107000"/>
+                        </a:lnSpc>
+                        <a:spcBef>
+                          <a:spcPts val="0"/>
+                        </a:spcBef>
+                        <a:spcAft>
+                          <a:spcPts val="0"/>
+                        </a:spcAft>
+                      </a:pPr>
+                      <a:r>
+                        <a:rPr lang="en-US" sz="500">
+                          <a:effectLst/>
+                        </a:rPr>
+                        <a:t>8.2% match with Triangle_18</a:t>
+                      </a:r>
+                    </a:p>
+                    <a:p>
+                      <a:pPr marL="0" marR="0" algn="just">
+                        <a:lnSpc>
+                          <a:spcPct val="107000"/>
+                        </a:lnSpc>
+                        <a:spcBef>
+                          <a:spcPts val="0"/>
+                        </a:spcBef>
+                        <a:spcAft>
+                          <a:spcPts val="0"/>
+                        </a:spcAft>
+                      </a:pPr>
+                      <a:r>
+                        <a:rPr lang="en-US" sz="500">
+                          <a:effectLst/>
+                        </a:rPr>
+                        <a:t>8.2% match with Triangle_20</a:t>
+                      </a:r>
+                    </a:p>
+                    <a:p>
+                      <a:pPr marL="0" marR="0" algn="just">
+                        <a:lnSpc>
+                          <a:spcPct val="107000"/>
+                        </a:lnSpc>
+                        <a:spcBef>
+                          <a:spcPts val="0"/>
+                        </a:spcBef>
+                        <a:spcAft>
+                          <a:spcPts val="0"/>
+                        </a:spcAft>
+                      </a:pPr>
+                      <a:r>
+                        <a:rPr lang="en-US" sz="500">
+                          <a:effectLst/>
+                        </a:rPr>
+                        <a:t>8.2% match with Triangle_26</a:t>
+                      </a:r>
+                    </a:p>
+                    <a:p>
+                      <a:pPr marL="0" marR="0" algn="just">
+                        <a:lnSpc>
+                          <a:spcPct val="107000"/>
+                        </a:lnSpc>
+                        <a:spcBef>
+                          <a:spcPts val="0"/>
+                        </a:spcBef>
+                        <a:spcAft>
+                          <a:spcPts val="0"/>
+                        </a:spcAft>
+                      </a:pPr>
+                      <a:r>
+                        <a:rPr lang="en-US" sz="500">
+                          <a:effectLst/>
+                        </a:rPr>
+                        <a:t>7.4% match with Triangle_25</a:t>
+                      </a:r>
+                      <a:endParaRPr lang="en-US" sz="500">
+                        <a:effectLst/>
+                        <a:latin typeface="Times New Roman" panose="02020603050405020304" pitchFamily="18" charset="0"/>
+                        <a:ea typeface="SimSun" panose="02010600030101010101" pitchFamily="2" charset="-122"/>
+                        <a:cs typeface="Times New Roman" panose="02020603050405020304" pitchFamily="18" charset="0"/>
+                      </a:endParaRPr>
+                    </a:p>
+                  </a:txBody>
+                  <a:tcPr marL="24955" marR="24955" marT="0" marB="0"/>
+                </a:tc>
+                <a:extLst>
+                  <a:ext uri="{0D108BD9-81ED-4DB2-BD59-A6C34878D82A}">
+                    <a16:rowId xmlns:a16="http://schemas.microsoft.com/office/drawing/2014/main" val="1990599514"/>
+                  </a:ext>
+                </a:extLst>
+              </a:tr>
+              <a:tr h="546892">
+                <a:tc>
+                  <a:txBody>
+                    <a:bodyPr/>
+                    <a:lstStyle/>
+                    <a:p>
+                      <a:pPr marL="0" marR="0" algn="just">
+                        <a:lnSpc>
+                          <a:spcPct val="107000"/>
+                        </a:lnSpc>
+                        <a:spcBef>
+                          <a:spcPts val="0"/>
+                        </a:spcBef>
+                        <a:spcAft>
+                          <a:spcPts val="0"/>
+                        </a:spcAft>
+                      </a:pPr>
+                      <a:r>
+                        <a:rPr lang="en-US" sz="800" u="none" strike="noStrike" dirty="0">
+                          <a:solidFill>
+                            <a:schemeClr val="accent5">
+                              <a:lumMod val="75000"/>
+                            </a:schemeClr>
+                          </a:solidFill>
+                          <a:effectLst/>
+                          <a:hlinkClick r:id="rId4">
+                            <a:extLst>
+                              <a:ext uri="{A12FA001-AC4F-418D-AE19-62706E023703}">
+                                <ahyp:hlinkClr xmlns:ahyp="http://schemas.microsoft.com/office/drawing/2018/hyperlinkcolor" val="tx"/>
+                              </a:ext>
+                            </a:extLst>
+                          </a:hlinkClick>
+                        </a:rPr>
+                        <a:t>Line_line_11.png</a:t>
+                      </a:r>
+                      <a:endParaRPr lang="en-US" sz="800" dirty="0">
+                        <a:solidFill>
+                          <a:schemeClr val="accent5">
+                            <a:lumMod val="75000"/>
+                          </a:schemeClr>
+                        </a:solidFill>
+                        <a:effectLst/>
+                        <a:latin typeface="Times New Roman" panose="02020603050405020304" pitchFamily="18" charset="0"/>
+                        <a:ea typeface="SimSun" panose="02010600030101010101" pitchFamily="2" charset="-122"/>
+                        <a:cs typeface="Times New Roman" panose="02020603050405020304" pitchFamily="18" charset="0"/>
+                      </a:endParaRPr>
+                    </a:p>
+                  </a:txBody>
+                  <a:tcPr marL="24955" marR="24955" marT="0" marB="0"/>
+                </a:tc>
+                <a:tc>
+                  <a:txBody>
+                    <a:bodyPr/>
+                    <a:lstStyle/>
+                    <a:p>
+                      <a:pPr marL="0" marR="0" algn="just">
+                        <a:lnSpc>
+                          <a:spcPct val="107000"/>
+                        </a:lnSpc>
+                        <a:spcBef>
+                          <a:spcPts val="0"/>
+                        </a:spcBef>
+                        <a:spcAft>
+                          <a:spcPts val="0"/>
+                        </a:spcAft>
+                      </a:pPr>
+                      <a:r>
+                        <a:rPr lang="en-US" sz="500" dirty="0">
+                          <a:effectLst/>
+                        </a:rPr>
+                        <a:t>13.61% match with Line_30</a:t>
+                      </a:r>
+                    </a:p>
+                    <a:p>
+                      <a:pPr marL="0" marR="0" algn="just">
+                        <a:lnSpc>
+                          <a:spcPct val="107000"/>
+                        </a:lnSpc>
+                        <a:spcBef>
+                          <a:spcPts val="0"/>
+                        </a:spcBef>
+                        <a:spcAft>
+                          <a:spcPts val="0"/>
+                        </a:spcAft>
+                      </a:pPr>
+                      <a:r>
+                        <a:rPr lang="en-US" sz="500" dirty="0">
+                          <a:effectLst/>
+                        </a:rPr>
+                        <a:t>9.77% match with Line_13</a:t>
+                      </a:r>
+                    </a:p>
+                    <a:p>
+                      <a:pPr marL="0" marR="0" algn="just">
+                        <a:lnSpc>
+                          <a:spcPct val="107000"/>
+                        </a:lnSpc>
+                        <a:spcBef>
+                          <a:spcPts val="0"/>
+                        </a:spcBef>
+                        <a:spcAft>
+                          <a:spcPts val="0"/>
+                        </a:spcAft>
+                      </a:pPr>
+                      <a:r>
+                        <a:rPr lang="en-US" sz="500" dirty="0">
+                          <a:effectLst/>
+                        </a:rPr>
+                        <a:t>9.42% match with Triangle_10</a:t>
+                      </a:r>
+                    </a:p>
+                    <a:p>
+                      <a:pPr marL="0" marR="0" algn="just">
+                        <a:lnSpc>
+                          <a:spcPct val="107000"/>
+                        </a:lnSpc>
+                        <a:spcBef>
+                          <a:spcPts val="0"/>
+                        </a:spcBef>
+                        <a:spcAft>
+                          <a:spcPts val="0"/>
+                        </a:spcAft>
+                      </a:pPr>
+                      <a:r>
+                        <a:rPr lang="en-US" sz="500" dirty="0">
+                          <a:effectLst/>
+                        </a:rPr>
+                        <a:t>9.42% match with Triangle_34</a:t>
+                      </a:r>
+                    </a:p>
+                    <a:p>
+                      <a:pPr marL="0" marR="0" algn="just">
+                        <a:lnSpc>
+                          <a:spcPct val="107000"/>
+                        </a:lnSpc>
+                        <a:spcBef>
+                          <a:spcPts val="0"/>
+                        </a:spcBef>
+                        <a:spcAft>
+                          <a:spcPts val="0"/>
+                        </a:spcAft>
+                      </a:pPr>
+                      <a:r>
+                        <a:rPr lang="en-US" sz="500" dirty="0">
+                          <a:effectLst/>
+                        </a:rPr>
+                        <a:t>5.58% match with Triangle_35</a:t>
+                      </a:r>
+                      <a:endParaRPr lang="en-US" sz="500" dirty="0">
+                        <a:effectLst/>
+                        <a:latin typeface="Times New Roman" panose="02020603050405020304" pitchFamily="18" charset="0"/>
+                        <a:ea typeface="SimSun" panose="02010600030101010101" pitchFamily="2" charset="-122"/>
+                        <a:cs typeface="Times New Roman" panose="02020603050405020304" pitchFamily="18" charset="0"/>
+                      </a:endParaRPr>
+                    </a:p>
+                  </a:txBody>
+                  <a:tcPr marL="24955" marR="24955" marT="0" marB="0"/>
+                </a:tc>
+                <a:extLst>
+                  <a:ext uri="{0D108BD9-81ED-4DB2-BD59-A6C34878D82A}">
+                    <a16:rowId xmlns:a16="http://schemas.microsoft.com/office/drawing/2014/main" val="3578121621"/>
+                  </a:ext>
+                </a:extLst>
+              </a:tr>
+              <a:tr h="498407">
+                <a:tc>
+                  <a:txBody>
+                    <a:bodyPr/>
+                    <a:lstStyle/>
+                    <a:p>
+                      <a:pPr marL="0" marR="0" algn="just">
+                        <a:lnSpc>
+                          <a:spcPct val="107000"/>
+                        </a:lnSpc>
+                        <a:spcBef>
+                          <a:spcPts val="0"/>
+                        </a:spcBef>
+                        <a:spcAft>
+                          <a:spcPts val="0"/>
+                        </a:spcAft>
+                      </a:pPr>
+                      <a:r>
+                        <a:rPr lang="en-US" sz="800" u="none" strike="noStrike" dirty="0">
+                          <a:solidFill>
+                            <a:schemeClr val="accent5">
+                              <a:lumMod val="75000"/>
+                            </a:schemeClr>
+                          </a:solidFill>
+                          <a:effectLst/>
+                          <a:hlinkClick r:id="rId5">
+                            <a:extLst>
+                              <a:ext uri="{A12FA001-AC4F-418D-AE19-62706E023703}">
+                                <ahyp:hlinkClr xmlns:ahyp="http://schemas.microsoft.com/office/drawing/2018/hyperlinkcolor" val="tx"/>
+                              </a:ext>
+                            </a:extLst>
+                          </a:hlinkClick>
+                        </a:rPr>
+                        <a:t>Line_line_22.png</a:t>
+                      </a:r>
+                      <a:endParaRPr lang="en-US" sz="800" dirty="0">
+                        <a:solidFill>
+                          <a:schemeClr val="accent5">
+                            <a:lumMod val="75000"/>
+                          </a:schemeClr>
+                        </a:solidFill>
+                        <a:effectLst/>
+                        <a:latin typeface="Times New Roman" panose="02020603050405020304" pitchFamily="18" charset="0"/>
+                        <a:ea typeface="SimSun" panose="02010600030101010101" pitchFamily="2" charset="-122"/>
+                        <a:cs typeface="Times New Roman" panose="02020603050405020304" pitchFamily="18" charset="0"/>
+                      </a:endParaRPr>
+                    </a:p>
+                  </a:txBody>
+                  <a:tcPr marL="24955" marR="24955" marT="0" marB="0"/>
+                </a:tc>
+                <a:tc>
+                  <a:txBody>
+                    <a:bodyPr/>
+                    <a:lstStyle/>
+                    <a:p>
+                      <a:pPr marL="0" marR="0" algn="just">
+                        <a:lnSpc>
+                          <a:spcPct val="107000"/>
+                        </a:lnSpc>
+                        <a:spcBef>
+                          <a:spcPts val="0"/>
+                        </a:spcBef>
+                        <a:spcAft>
+                          <a:spcPts val="0"/>
+                        </a:spcAft>
+                      </a:pPr>
+                      <a:r>
+                        <a:rPr lang="en-US" sz="500">
+                          <a:effectLst/>
+                        </a:rPr>
+                        <a:t>12.02% match with Triangle_28</a:t>
+                      </a:r>
+                    </a:p>
+                    <a:p>
+                      <a:pPr marL="0" marR="0" algn="just">
+                        <a:lnSpc>
+                          <a:spcPct val="107000"/>
+                        </a:lnSpc>
+                        <a:spcBef>
+                          <a:spcPts val="0"/>
+                        </a:spcBef>
+                        <a:spcAft>
+                          <a:spcPts val="0"/>
+                        </a:spcAft>
+                      </a:pPr>
+                      <a:r>
+                        <a:rPr lang="en-US" sz="500">
+                          <a:effectLst/>
+                        </a:rPr>
+                        <a:t>10.18% match with Line_4</a:t>
+                      </a:r>
+                    </a:p>
+                    <a:p>
+                      <a:pPr marL="0" marR="0" algn="just">
+                        <a:lnSpc>
+                          <a:spcPct val="107000"/>
+                        </a:lnSpc>
+                        <a:spcBef>
+                          <a:spcPts val="0"/>
+                        </a:spcBef>
+                        <a:spcAft>
+                          <a:spcPts val="0"/>
+                        </a:spcAft>
+                      </a:pPr>
+                      <a:r>
+                        <a:rPr lang="en-US" sz="500">
+                          <a:effectLst/>
+                        </a:rPr>
+                        <a:t>8.35% match with Triangle_27</a:t>
+                      </a:r>
+                    </a:p>
+                    <a:p>
+                      <a:pPr marL="0" marR="0" algn="just">
+                        <a:lnSpc>
+                          <a:spcPct val="107000"/>
+                        </a:lnSpc>
+                        <a:spcBef>
+                          <a:spcPts val="0"/>
+                        </a:spcBef>
+                        <a:spcAft>
+                          <a:spcPts val="0"/>
+                        </a:spcAft>
+                      </a:pPr>
+                      <a:r>
+                        <a:rPr lang="en-US" sz="500">
+                          <a:effectLst/>
+                        </a:rPr>
+                        <a:t>7.5% match with Rectangle_1</a:t>
+                      </a:r>
+                    </a:p>
+                    <a:p>
+                      <a:pPr marL="0" marR="0" algn="just">
+                        <a:lnSpc>
+                          <a:spcPct val="107000"/>
+                        </a:lnSpc>
+                        <a:spcBef>
+                          <a:spcPts val="0"/>
+                        </a:spcBef>
+                        <a:spcAft>
+                          <a:spcPts val="0"/>
+                        </a:spcAft>
+                      </a:pPr>
+                      <a:r>
+                        <a:rPr lang="en-US" sz="500">
+                          <a:effectLst/>
+                        </a:rPr>
+                        <a:t>6.84% match with Triangle_17</a:t>
+                      </a:r>
+                      <a:endParaRPr lang="en-US" sz="500">
+                        <a:effectLst/>
+                        <a:latin typeface="Times New Roman" panose="02020603050405020304" pitchFamily="18" charset="0"/>
+                        <a:ea typeface="SimSun" panose="02010600030101010101" pitchFamily="2" charset="-122"/>
+                        <a:cs typeface="Times New Roman" panose="02020603050405020304" pitchFamily="18" charset="0"/>
+                      </a:endParaRPr>
+                    </a:p>
+                  </a:txBody>
+                  <a:tcPr marL="24955" marR="24955" marT="0" marB="0"/>
+                </a:tc>
+                <a:extLst>
+                  <a:ext uri="{0D108BD9-81ED-4DB2-BD59-A6C34878D82A}">
+                    <a16:rowId xmlns:a16="http://schemas.microsoft.com/office/drawing/2014/main" val="2245416251"/>
+                  </a:ext>
+                </a:extLst>
+              </a:tr>
+              <a:tr h="546892">
+                <a:tc>
+                  <a:txBody>
+                    <a:bodyPr/>
+                    <a:lstStyle/>
+                    <a:p>
+                      <a:pPr marL="0" marR="0" algn="just">
+                        <a:lnSpc>
+                          <a:spcPct val="107000"/>
+                        </a:lnSpc>
+                        <a:spcBef>
+                          <a:spcPts val="0"/>
+                        </a:spcBef>
+                        <a:spcAft>
+                          <a:spcPts val="0"/>
+                        </a:spcAft>
+                      </a:pPr>
+                      <a:r>
+                        <a:rPr lang="en-US" sz="800" u="none" strike="noStrike" dirty="0">
+                          <a:solidFill>
+                            <a:schemeClr val="accent5">
+                              <a:lumMod val="75000"/>
+                            </a:schemeClr>
+                          </a:solidFill>
+                          <a:effectLst/>
+                          <a:hlinkClick r:id="rId6">
+                            <a:extLst>
+                              <a:ext uri="{A12FA001-AC4F-418D-AE19-62706E023703}">
+                                <ahyp:hlinkClr xmlns:ahyp="http://schemas.microsoft.com/office/drawing/2018/hyperlinkcolor" val="tx"/>
+                              </a:ext>
+                            </a:extLst>
+                          </a:hlinkClick>
+                        </a:rPr>
+                        <a:t>Rectangle_rectangle_18.png</a:t>
+                      </a:r>
+                      <a:r>
+                        <a:rPr lang="en-US" sz="800" dirty="0">
+                          <a:solidFill>
+                            <a:schemeClr val="accent5">
+                              <a:lumMod val="75000"/>
+                            </a:schemeClr>
+                          </a:solidFill>
+                          <a:effectLst/>
+                        </a:rPr>
+                        <a:t> </a:t>
+                      </a:r>
+                      <a:endParaRPr lang="en-US" sz="800" dirty="0">
+                        <a:solidFill>
+                          <a:schemeClr val="accent5">
+                            <a:lumMod val="75000"/>
+                          </a:schemeClr>
+                        </a:solidFill>
+                        <a:effectLst/>
+                        <a:latin typeface="Times New Roman" panose="02020603050405020304" pitchFamily="18" charset="0"/>
+                        <a:ea typeface="SimSun" panose="02010600030101010101" pitchFamily="2" charset="-122"/>
+                        <a:cs typeface="Times New Roman" panose="02020603050405020304" pitchFamily="18" charset="0"/>
+                      </a:endParaRPr>
+                    </a:p>
+                  </a:txBody>
+                  <a:tcPr marL="24955" marR="24955" marT="0" marB="0"/>
+                </a:tc>
+                <a:tc>
+                  <a:txBody>
+                    <a:bodyPr/>
+                    <a:lstStyle/>
+                    <a:p>
+                      <a:pPr marL="0" marR="0" algn="just">
+                        <a:lnSpc>
+                          <a:spcPct val="107000"/>
+                        </a:lnSpc>
+                        <a:spcBef>
+                          <a:spcPts val="0"/>
+                        </a:spcBef>
+                        <a:spcAft>
+                          <a:spcPts val="0"/>
+                        </a:spcAft>
+                      </a:pPr>
+                      <a:r>
+                        <a:rPr lang="en-US" sz="500">
+                          <a:effectLst/>
+                        </a:rPr>
+                        <a:t>15.16% match with Triangle_2</a:t>
+                      </a:r>
+                    </a:p>
+                    <a:p>
+                      <a:pPr marL="0" marR="0" algn="just">
+                        <a:lnSpc>
+                          <a:spcPct val="107000"/>
+                        </a:lnSpc>
+                        <a:spcBef>
+                          <a:spcPts val="0"/>
+                        </a:spcBef>
+                        <a:spcAft>
+                          <a:spcPts val="0"/>
+                        </a:spcAft>
+                      </a:pPr>
+                      <a:r>
+                        <a:rPr lang="en-US" sz="500">
+                          <a:effectLst/>
+                        </a:rPr>
+                        <a:t>14.29% match with Triangle_3</a:t>
+                      </a:r>
+                    </a:p>
+                    <a:p>
+                      <a:pPr marL="0" marR="0" algn="just">
+                        <a:lnSpc>
+                          <a:spcPct val="107000"/>
+                        </a:lnSpc>
+                        <a:spcBef>
+                          <a:spcPts val="0"/>
+                        </a:spcBef>
+                        <a:spcAft>
+                          <a:spcPts val="0"/>
+                        </a:spcAft>
+                      </a:pPr>
+                      <a:r>
+                        <a:rPr lang="en-US" sz="500">
+                          <a:effectLst/>
+                        </a:rPr>
+                        <a:t>14.29% match with Triangle_10</a:t>
+                      </a:r>
+                    </a:p>
+                    <a:p>
+                      <a:pPr marL="0" marR="0" algn="just">
+                        <a:lnSpc>
+                          <a:spcPct val="107000"/>
+                        </a:lnSpc>
+                        <a:spcBef>
+                          <a:spcPts val="0"/>
+                        </a:spcBef>
+                        <a:spcAft>
+                          <a:spcPts val="0"/>
+                        </a:spcAft>
+                      </a:pPr>
+                      <a:r>
+                        <a:rPr lang="en-US" sz="500">
+                          <a:effectLst/>
+                        </a:rPr>
+                        <a:t>12.09% match with Triangle_12</a:t>
+                      </a:r>
+                    </a:p>
+                    <a:p>
+                      <a:pPr marL="0" marR="0" algn="just">
+                        <a:lnSpc>
+                          <a:spcPct val="107000"/>
+                        </a:lnSpc>
+                        <a:spcBef>
+                          <a:spcPts val="0"/>
+                        </a:spcBef>
+                        <a:spcAft>
+                          <a:spcPts val="0"/>
+                        </a:spcAft>
+                      </a:pPr>
+                      <a:r>
+                        <a:rPr lang="en-US" sz="500">
+                          <a:effectLst/>
+                        </a:rPr>
+                        <a:t>10.56% match with Triangle_1</a:t>
+                      </a:r>
+                      <a:endParaRPr lang="en-US" sz="500">
+                        <a:effectLst/>
+                        <a:latin typeface="Times New Roman" panose="02020603050405020304" pitchFamily="18" charset="0"/>
+                        <a:ea typeface="SimSun" panose="02010600030101010101" pitchFamily="2" charset="-122"/>
+                        <a:cs typeface="Times New Roman" panose="02020603050405020304" pitchFamily="18" charset="0"/>
+                      </a:endParaRPr>
+                    </a:p>
+                  </a:txBody>
+                  <a:tcPr marL="24955" marR="24955" marT="0" marB="0"/>
+                </a:tc>
+                <a:extLst>
+                  <a:ext uri="{0D108BD9-81ED-4DB2-BD59-A6C34878D82A}">
+                    <a16:rowId xmlns:a16="http://schemas.microsoft.com/office/drawing/2014/main" val="1046045452"/>
+                  </a:ext>
+                </a:extLst>
+              </a:tr>
+              <a:tr h="546892">
+                <a:tc>
+                  <a:txBody>
+                    <a:bodyPr/>
+                    <a:lstStyle/>
+                    <a:p>
+                      <a:pPr marL="0" marR="0" algn="just">
+                        <a:lnSpc>
+                          <a:spcPct val="107000"/>
+                        </a:lnSpc>
+                        <a:spcBef>
+                          <a:spcPts val="0"/>
+                        </a:spcBef>
+                        <a:spcAft>
+                          <a:spcPts val="0"/>
+                        </a:spcAft>
+                      </a:pPr>
+                      <a:r>
+                        <a:rPr lang="en-US" sz="800" u="none" strike="noStrike" dirty="0">
+                          <a:solidFill>
+                            <a:schemeClr val="accent5">
+                              <a:lumMod val="75000"/>
+                            </a:schemeClr>
+                          </a:solidFill>
+                          <a:effectLst/>
+                          <a:hlinkClick r:id="rId7">
+                            <a:extLst>
+                              <a:ext uri="{A12FA001-AC4F-418D-AE19-62706E023703}">
+                                <ahyp:hlinkClr xmlns:ahyp="http://schemas.microsoft.com/office/drawing/2018/hyperlinkcolor" val="tx"/>
+                              </a:ext>
+                            </a:extLst>
+                          </a:hlinkClick>
+                        </a:rPr>
+                        <a:t>Rectangle_rectangle_28.png</a:t>
+                      </a:r>
+                      <a:endParaRPr lang="en-US" sz="800" dirty="0">
+                        <a:solidFill>
+                          <a:schemeClr val="accent5">
+                            <a:lumMod val="75000"/>
+                          </a:schemeClr>
+                        </a:solidFill>
+                        <a:effectLst/>
+                        <a:latin typeface="Times New Roman" panose="02020603050405020304" pitchFamily="18" charset="0"/>
+                        <a:ea typeface="SimSun" panose="02010600030101010101" pitchFamily="2" charset="-122"/>
+                        <a:cs typeface="Times New Roman" panose="02020603050405020304" pitchFamily="18" charset="0"/>
+                      </a:endParaRPr>
+                    </a:p>
+                  </a:txBody>
+                  <a:tcPr marL="24955" marR="24955" marT="0" marB="0"/>
+                </a:tc>
+                <a:tc>
+                  <a:txBody>
+                    <a:bodyPr/>
+                    <a:lstStyle/>
+                    <a:p>
+                      <a:pPr marL="0" marR="0" algn="just">
+                        <a:lnSpc>
+                          <a:spcPct val="107000"/>
+                        </a:lnSpc>
+                        <a:spcBef>
+                          <a:spcPts val="0"/>
+                        </a:spcBef>
+                        <a:spcAft>
+                          <a:spcPts val="0"/>
+                        </a:spcAft>
+                      </a:pPr>
+                      <a:r>
+                        <a:rPr lang="en-US" sz="500">
+                          <a:effectLst/>
+                        </a:rPr>
+                        <a:t>25.41% match with Triangle_5</a:t>
+                      </a:r>
+                    </a:p>
+                    <a:p>
+                      <a:pPr marL="0" marR="0" algn="just">
+                        <a:lnSpc>
+                          <a:spcPct val="107000"/>
+                        </a:lnSpc>
+                        <a:spcBef>
+                          <a:spcPts val="0"/>
+                        </a:spcBef>
+                        <a:spcAft>
+                          <a:spcPts val="0"/>
+                        </a:spcAft>
+                      </a:pPr>
+                      <a:r>
+                        <a:rPr lang="en-US" sz="500">
+                          <a:effectLst/>
+                        </a:rPr>
+                        <a:t>15.14% match with Triangle_9</a:t>
+                      </a:r>
+                    </a:p>
+                    <a:p>
+                      <a:pPr marL="0" marR="0" algn="just">
+                        <a:lnSpc>
+                          <a:spcPct val="107000"/>
+                        </a:lnSpc>
+                        <a:spcBef>
+                          <a:spcPts val="0"/>
+                        </a:spcBef>
+                        <a:spcAft>
+                          <a:spcPts val="0"/>
+                        </a:spcAft>
+                      </a:pPr>
+                      <a:r>
+                        <a:rPr lang="en-US" sz="500">
+                          <a:effectLst/>
+                        </a:rPr>
+                        <a:t>9.19% match with Triangle_32</a:t>
+                      </a:r>
+                    </a:p>
+                    <a:p>
+                      <a:pPr marL="0" marR="0" algn="just">
+                        <a:lnSpc>
+                          <a:spcPct val="107000"/>
+                        </a:lnSpc>
+                        <a:spcBef>
+                          <a:spcPts val="0"/>
+                        </a:spcBef>
+                        <a:spcAft>
+                          <a:spcPts val="0"/>
+                        </a:spcAft>
+                      </a:pPr>
+                      <a:r>
+                        <a:rPr lang="en-US" sz="500">
+                          <a:effectLst/>
+                        </a:rPr>
+                        <a:t>9.06% match with Rectangle_3</a:t>
+                      </a:r>
+                    </a:p>
+                    <a:p>
+                      <a:pPr marL="0" marR="0" algn="just">
+                        <a:lnSpc>
+                          <a:spcPct val="107000"/>
+                        </a:lnSpc>
+                        <a:spcBef>
+                          <a:spcPts val="0"/>
+                        </a:spcBef>
+                        <a:spcAft>
+                          <a:spcPts val="0"/>
+                        </a:spcAft>
+                      </a:pPr>
+                      <a:r>
+                        <a:rPr lang="en-US" sz="500">
+                          <a:effectLst/>
+                        </a:rPr>
+                        <a:t>7.57% match with Triangle_6</a:t>
+                      </a:r>
+                      <a:endParaRPr lang="en-US" sz="500">
+                        <a:effectLst/>
+                        <a:latin typeface="Times New Roman" panose="02020603050405020304" pitchFamily="18" charset="0"/>
+                        <a:ea typeface="SimSun" panose="02010600030101010101" pitchFamily="2" charset="-122"/>
+                        <a:cs typeface="Times New Roman" panose="02020603050405020304" pitchFamily="18" charset="0"/>
+                      </a:endParaRPr>
+                    </a:p>
+                  </a:txBody>
+                  <a:tcPr marL="24955" marR="24955" marT="0" marB="0"/>
+                </a:tc>
+                <a:extLst>
+                  <a:ext uri="{0D108BD9-81ED-4DB2-BD59-A6C34878D82A}">
+                    <a16:rowId xmlns:a16="http://schemas.microsoft.com/office/drawing/2014/main" val="3583918258"/>
+                  </a:ext>
+                </a:extLst>
+              </a:tr>
+              <a:tr h="546892">
+                <a:tc>
+                  <a:txBody>
+                    <a:bodyPr/>
+                    <a:lstStyle/>
+                    <a:p>
+                      <a:pPr marL="0" marR="0" algn="just">
+                        <a:lnSpc>
+                          <a:spcPct val="107000"/>
+                        </a:lnSpc>
+                        <a:spcBef>
+                          <a:spcPts val="0"/>
+                        </a:spcBef>
+                        <a:spcAft>
+                          <a:spcPts val="0"/>
+                        </a:spcAft>
+                      </a:pPr>
+                      <a:r>
+                        <a:rPr lang="en-US" sz="800" u="none" strike="noStrike" dirty="0">
+                          <a:solidFill>
+                            <a:schemeClr val="accent5">
+                              <a:lumMod val="75000"/>
+                            </a:schemeClr>
+                          </a:solidFill>
+                          <a:effectLst/>
+                          <a:hlinkClick r:id="rId8">
+                            <a:extLst>
+                              <a:ext uri="{A12FA001-AC4F-418D-AE19-62706E023703}">
+                                <ahyp:hlinkClr xmlns:ahyp="http://schemas.microsoft.com/office/drawing/2018/hyperlinkcolor" val="tx"/>
+                              </a:ext>
+                            </a:extLst>
+                          </a:hlinkClick>
+                        </a:rPr>
+                        <a:t>Triangle_triangle_23.png</a:t>
+                      </a:r>
+                      <a:endParaRPr lang="en-US" sz="800" dirty="0">
+                        <a:solidFill>
+                          <a:schemeClr val="accent5">
+                            <a:lumMod val="75000"/>
+                          </a:schemeClr>
+                        </a:solidFill>
+                        <a:effectLst/>
+                        <a:latin typeface="Times New Roman" panose="02020603050405020304" pitchFamily="18" charset="0"/>
+                        <a:ea typeface="SimSun" panose="02010600030101010101" pitchFamily="2" charset="-122"/>
+                        <a:cs typeface="Times New Roman" panose="02020603050405020304" pitchFamily="18" charset="0"/>
+                      </a:endParaRPr>
+                    </a:p>
+                  </a:txBody>
+                  <a:tcPr marL="24955" marR="24955" marT="0" marB="0"/>
+                </a:tc>
+                <a:tc>
+                  <a:txBody>
+                    <a:bodyPr/>
+                    <a:lstStyle/>
+                    <a:p>
+                      <a:pPr marL="0" marR="0" algn="just">
+                        <a:lnSpc>
+                          <a:spcPct val="107000"/>
+                        </a:lnSpc>
+                        <a:spcBef>
+                          <a:spcPts val="0"/>
+                        </a:spcBef>
+                        <a:spcAft>
+                          <a:spcPts val="0"/>
+                        </a:spcAft>
+                      </a:pPr>
+                      <a:r>
+                        <a:rPr lang="en-US" sz="500">
+                          <a:effectLst/>
+                        </a:rPr>
+                        <a:t>96.18% match with Triangle_1</a:t>
+                      </a:r>
+                    </a:p>
+                    <a:p>
+                      <a:pPr marL="0" marR="0" algn="just">
+                        <a:lnSpc>
+                          <a:spcPct val="107000"/>
+                        </a:lnSpc>
+                        <a:spcBef>
+                          <a:spcPts val="0"/>
+                        </a:spcBef>
+                        <a:spcAft>
+                          <a:spcPts val="0"/>
+                        </a:spcAft>
+                      </a:pPr>
+                      <a:r>
+                        <a:rPr lang="en-US" sz="500">
+                          <a:effectLst/>
+                        </a:rPr>
+                        <a:t>27.32% match with Rectangle_1</a:t>
+                      </a:r>
+                    </a:p>
+                    <a:p>
+                      <a:pPr marL="0" marR="0" algn="just">
+                        <a:lnSpc>
+                          <a:spcPct val="107000"/>
+                        </a:lnSpc>
+                        <a:spcBef>
+                          <a:spcPts val="0"/>
+                        </a:spcBef>
+                        <a:spcAft>
+                          <a:spcPts val="0"/>
+                        </a:spcAft>
+                      </a:pPr>
+                      <a:r>
+                        <a:rPr lang="en-US" sz="500">
+                          <a:effectLst/>
+                        </a:rPr>
+                        <a:t>24.51% match with Triangle_2</a:t>
+                      </a:r>
+                    </a:p>
+                    <a:p>
+                      <a:pPr marL="0" marR="0" algn="just">
+                        <a:lnSpc>
+                          <a:spcPct val="107000"/>
+                        </a:lnSpc>
+                        <a:spcBef>
+                          <a:spcPts val="0"/>
+                        </a:spcBef>
+                        <a:spcAft>
+                          <a:spcPts val="0"/>
+                        </a:spcAft>
+                      </a:pPr>
+                      <a:r>
+                        <a:rPr lang="en-US" sz="500">
+                          <a:effectLst/>
+                        </a:rPr>
+                        <a:t>7.39% match with Rectangle_2</a:t>
+                      </a:r>
+                    </a:p>
+                    <a:p>
+                      <a:pPr marL="0" marR="0" algn="just">
+                        <a:lnSpc>
+                          <a:spcPct val="107000"/>
+                        </a:lnSpc>
+                        <a:spcBef>
+                          <a:spcPts val="0"/>
+                        </a:spcBef>
+                        <a:spcAft>
+                          <a:spcPts val="0"/>
+                        </a:spcAft>
+                      </a:pPr>
+                      <a:r>
+                        <a:rPr lang="en-US" sz="500">
+                          <a:effectLst/>
+                        </a:rPr>
+                        <a:t>6.36% match with Rectangle_5</a:t>
+                      </a:r>
+                      <a:endParaRPr lang="en-US" sz="500">
+                        <a:effectLst/>
+                        <a:latin typeface="Times New Roman" panose="02020603050405020304" pitchFamily="18" charset="0"/>
+                        <a:ea typeface="SimSun" panose="02010600030101010101" pitchFamily="2" charset="-122"/>
+                        <a:cs typeface="Times New Roman" panose="02020603050405020304" pitchFamily="18" charset="0"/>
+                      </a:endParaRPr>
+                    </a:p>
+                  </a:txBody>
+                  <a:tcPr marL="24955" marR="24955" marT="0" marB="0"/>
+                </a:tc>
+                <a:extLst>
+                  <a:ext uri="{0D108BD9-81ED-4DB2-BD59-A6C34878D82A}">
+                    <a16:rowId xmlns:a16="http://schemas.microsoft.com/office/drawing/2014/main" val="2015922571"/>
+                  </a:ext>
+                </a:extLst>
+              </a:tr>
+              <a:tr h="546892">
+                <a:tc>
+                  <a:txBody>
+                    <a:bodyPr/>
+                    <a:lstStyle/>
+                    <a:p>
+                      <a:pPr marL="0" marR="0" algn="just">
+                        <a:lnSpc>
+                          <a:spcPct val="107000"/>
+                        </a:lnSpc>
+                        <a:spcBef>
+                          <a:spcPts val="0"/>
+                        </a:spcBef>
+                        <a:spcAft>
+                          <a:spcPts val="0"/>
+                        </a:spcAft>
+                      </a:pPr>
+                      <a:r>
+                        <a:rPr lang="en-US" sz="800" u="none" strike="noStrike" dirty="0">
+                          <a:solidFill>
+                            <a:schemeClr val="accent5">
+                              <a:lumMod val="75000"/>
+                            </a:schemeClr>
+                          </a:solidFill>
+                          <a:effectLst/>
+                          <a:hlinkClick r:id="rId9">
+                            <a:extLst>
+                              <a:ext uri="{A12FA001-AC4F-418D-AE19-62706E023703}">
+                                <ahyp:hlinkClr xmlns:ahyp="http://schemas.microsoft.com/office/drawing/2018/hyperlinkcolor" val="tx"/>
+                              </a:ext>
+                            </a:extLst>
+                          </a:hlinkClick>
+                        </a:rPr>
+                        <a:t>Triangle_triangle_0.png</a:t>
+                      </a:r>
+                      <a:endParaRPr lang="en-US" sz="800" dirty="0">
+                        <a:solidFill>
+                          <a:schemeClr val="accent5">
+                            <a:lumMod val="75000"/>
+                          </a:schemeClr>
+                        </a:solidFill>
+                        <a:effectLst/>
+                        <a:latin typeface="Times New Roman" panose="02020603050405020304" pitchFamily="18" charset="0"/>
+                        <a:ea typeface="SimSun" panose="02010600030101010101" pitchFamily="2" charset="-122"/>
+                        <a:cs typeface="Times New Roman" panose="02020603050405020304" pitchFamily="18" charset="0"/>
+                      </a:endParaRPr>
+                    </a:p>
+                  </a:txBody>
+                  <a:tcPr marL="24955" marR="24955" marT="0" marB="0"/>
+                </a:tc>
+                <a:tc>
+                  <a:txBody>
+                    <a:bodyPr/>
+                    <a:lstStyle/>
+                    <a:p>
+                      <a:pPr marL="0" marR="0" algn="just">
+                        <a:lnSpc>
+                          <a:spcPct val="107000"/>
+                        </a:lnSpc>
+                        <a:spcBef>
+                          <a:spcPts val="0"/>
+                        </a:spcBef>
+                        <a:spcAft>
+                          <a:spcPts val="0"/>
+                        </a:spcAft>
+                      </a:pPr>
+                      <a:r>
+                        <a:rPr lang="en-US" sz="500" dirty="0">
+                          <a:effectLst/>
+                        </a:rPr>
+                        <a:t>11.93% match with Triangle_22</a:t>
+                      </a:r>
+                    </a:p>
+                    <a:p>
+                      <a:pPr marL="0" marR="0" algn="just">
+                        <a:lnSpc>
+                          <a:spcPct val="107000"/>
+                        </a:lnSpc>
+                        <a:spcBef>
+                          <a:spcPts val="0"/>
+                        </a:spcBef>
+                        <a:spcAft>
+                          <a:spcPts val="0"/>
+                        </a:spcAft>
+                      </a:pPr>
+                      <a:r>
+                        <a:rPr lang="en-US" sz="500" dirty="0">
+                          <a:effectLst/>
+                        </a:rPr>
+                        <a:t>11.93% match with Triangle_24</a:t>
+                      </a:r>
+                    </a:p>
+                    <a:p>
+                      <a:pPr marL="0" marR="0" algn="just">
+                        <a:lnSpc>
+                          <a:spcPct val="107000"/>
+                        </a:lnSpc>
+                        <a:spcBef>
+                          <a:spcPts val="0"/>
+                        </a:spcBef>
+                        <a:spcAft>
+                          <a:spcPts val="0"/>
+                        </a:spcAft>
+                      </a:pPr>
+                      <a:r>
+                        <a:rPr lang="en-US" sz="500" dirty="0">
+                          <a:effectLst/>
+                        </a:rPr>
+                        <a:t>11.7% match with Triangle_23</a:t>
+                      </a:r>
+                    </a:p>
+                    <a:p>
+                      <a:pPr marL="0" marR="0" algn="just">
+                        <a:lnSpc>
+                          <a:spcPct val="107000"/>
+                        </a:lnSpc>
+                        <a:spcBef>
+                          <a:spcPts val="0"/>
+                        </a:spcBef>
+                        <a:spcAft>
+                          <a:spcPts val="0"/>
+                        </a:spcAft>
+                      </a:pPr>
+                      <a:r>
+                        <a:rPr lang="en-US" sz="500" dirty="0">
+                          <a:effectLst/>
+                        </a:rPr>
+                        <a:t>8.19% match with Circle_1</a:t>
+                      </a:r>
+                    </a:p>
+                    <a:p>
+                      <a:pPr marL="0" marR="0" algn="just">
+                        <a:lnSpc>
+                          <a:spcPct val="107000"/>
+                        </a:lnSpc>
+                        <a:spcBef>
+                          <a:spcPts val="0"/>
+                        </a:spcBef>
+                        <a:spcAft>
+                          <a:spcPts val="0"/>
+                        </a:spcAft>
+                      </a:pPr>
+                      <a:r>
+                        <a:rPr lang="en-US" sz="500" dirty="0">
+                          <a:effectLst/>
+                        </a:rPr>
+                        <a:t>7.02% match with Triangle_25</a:t>
+                      </a:r>
+                      <a:endParaRPr lang="en-US" sz="500" dirty="0">
+                        <a:effectLst/>
+                        <a:latin typeface="Times New Roman" panose="02020603050405020304" pitchFamily="18" charset="0"/>
+                        <a:ea typeface="SimSun" panose="02010600030101010101" pitchFamily="2" charset="-122"/>
+                        <a:cs typeface="Times New Roman" panose="02020603050405020304" pitchFamily="18" charset="0"/>
+                      </a:endParaRPr>
+                    </a:p>
+                  </a:txBody>
+                  <a:tcPr marL="24955" marR="24955" marT="0" marB="0"/>
+                </a:tc>
+                <a:extLst>
+                  <a:ext uri="{0D108BD9-81ED-4DB2-BD59-A6C34878D82A}">
+                    <a16:rowId xmlns:a16="http://schemas.microsoft.com/office/drawing/2014/main" val="1290350021"/>
+                  </a:ext>
+                </a:extLst>
+              </a:tr>
+            </a:tbl>
+          </a:graphicData>
+        </a:graphic>
+      </p:graphicFrame>
+      <p:graphicFrame>
+        <p:nvGraphicFramePr>
+          <p:cNvPr id="8" name="Table 7">
+            <a:extLst>
+              <a:ext uri="{FF2B5EF4-FFF2-40B4-BE49-F238E27FC236}">
+                <a16:creationId xmlns:a16="http://schemas.microsoft.com/office/drawing/2014/main" id="{43418791-64F6-4B93-8449-06B531E98338}"/>
+              </a:ext>
+            </a:extLst>
+          </p:cNvPr>
+          <p:cNvGraphicFramePr>
+            <a:graphicFrameLocks noGrp="1"/>
+          </p:cNvGraphicFramePr>
+          <p:nvPr>
+            <p:extLst>
+              <p:ext uri="{D42A27DB-BD31-4B8C-83A1-F6EECF244321}">
+                <p14:modId xmlns:p14="http://schemas.microsoft.com/office/powerpoint/2010/main" val="4155080526"/>
+              </p:ext>
+            </p:extLst>
+          </p:nvPr>
+        </p:nvGraphicFramePr>
+        <p:xfrm>
+          <a:off x="7023207" y="504447"/>
+          <a:ext cx="2749208" cy="4504640"/>
+        </p:xfrm>
+        <a:graphic>
+          <a:graphicData uri="http://schemas.openxmlformats.org/drawingml/2006/table">
+            <a:tbl>
+              <a:tblPr firstRow="1" firstCol="1" bandRow="1">
+                <a:tableStyleId>{5C22544A-7EE6-4342-B048-85BDC9FD1C3A}</a:tableStyleId>
+              </a:tblPr>
+              <a:tblGrid>
+                <a:gridCol w="1155465">
+                  <a:extLst>
+                    <a:ext uri="{9D8B030D-6E8A-4147-A177-3AD203B41FA5}">
+                      <a16:colId xmlns:a16="http://schemas.microsoft.com/office/drawing/2014/main" val="4040408522"/>
+                    </a:ext>
+                  </a:extLst>
+                </a:gridCol>
+                <a:gridCol w="1593743">
+                  <a:extLst>
+                    <a:ext uri="{9D8B030D-6E8A-4147-A177-3AD203B41FA5}">
+                      <a16:colId xmlns:a16="http://schemas.microsoft.com/office/drawing/2014/main" val="1328997404"/>
+                    </a:ext>
+                  </a:extLst>
+                </a:gridCol>
+              </a:tblGrid>
+              <a:tr h="139916">
+                <a:tc>
+                  <a:txBody>
+                    <a:bodyPr/>
+                    <a:lstStyle/>
+                    <a:p>
+                      <a:pPr marL="0" marR="0" algn="just">
+                        <a:lnSpc>
+                          <a:spcPct val="107000"/>
+                        </a:lnSpc>
+                        <a:spcBef>
+                          <a:spcPts val="0"/>
+                        </a:spcBef>
+                        <a:spcAft>
+                          <a:spcPts val="0"/>
+                        </a:spcAft>
+                      </a:pPr>
+                      <a:r>
+                        <a:rPr lang="en-US" sz="500">
+                          <a:effectLst/>
+                        </a:rPr>
+                        <a:t>Input Picture Sequence</a:t>
+                      </a:r>
+                      <a:endParaRPr lang="en-US" sz="500">
+                        <a:effectLst/>
+                        <a:latin typeface="Times New Roman" panose="02020603050405020304" pitchFamily="18" charset="0"/>
+                        <a:ea typeface="SimSun" panose="02010600030101010101" pitchFamily="2" charset="-122"/>
+                        <a:cs typeface="Times New Roman" panose="02020603050405020304" pitchFamily="18" charset="0"/>
+                      </a:endParaRPr>
+                    </a:p>
+                  </a:txBody>
+                  <a:tcPr marL="36250" marR="36250" marT="0" marB="0"/>
+                </a:tc>
+                <a:tc>
+                  <a:txBody>
+                    <a:bodyPr/>
+                    <a:lstStyle/>
+                    <a:p>
+                      <a:pPr marL="0" marR="0" algn="just">
+                        <a:lnSpc>
+                          <a:spcPct val="107000"/>
+                        </a:lnSpc>
+                        <a:spcBef>
+                          <a:spcPts val="0"/>
+                        </a:spcBef>
+                        <a:spcAft>
+                          <a:spcPts val="0"/>
+                        </a:spcAft>
+                      </a:pPr>
+                      <a:r>
+                        <a:rPr lang="en-US" sz="500" dirty="0">
+                          <a:effectLst/>
+                        </a:rPr>
+                        <a:t>Possible Matches Found </a:t>
+                      </a:r>
+                      <a:endParaRPr lang="en-US" sz="500" dirty="0">
+                        <a:effectLst/>
+                        <a:latin typeface="Times New Roman" panose="02020603050405020304" pitchFamily="18" charset="0"/>
+                        <a:ea typeface="SimSun" panose="02010600030101010101" pitchFamily="2" charset="-122"/>
+                        <a:cs typeface="Times New Roman" panose="02020603050405020304" pitchFamily="18" charset="0"/>
+                      </a:endParaRPr>
+                    </a:p>
+                  </a:txBody>
+                  <a:tcPr marL="36250" marR="36250" marT="0" marB="0"/>
+                </a:tc>
+                <a:extLst>
+                  <a:ext uri="{0D108BD9-81ED-4DB2-BD59-A6C34878D82A}">
+                    <a16:rowId xmlns:a16="http://schemas.microsoft.com/office/drawing/2014/main" val="3309035910"/>
+                  </a:ext>
+                </a:extLst>
+              </a:tr>
+              <a:tr h="572635">
+                <a:tc>
+                  <a:txBody>
+                    <a:bodyPr/>
+                    <a:lstStyle/>
+                    <a:p>
+                      <a:pPr marL="0" marR="0" algn="just">
+                        <a:lnSpc>
+                          <a:spcPct val="107000"/>
+                        </a:lnSpc>
+                        <a:spcBef>
+                          <a:spcPts val="0"/>
+                        </a:spcBef>
+                        <a:spcAft>
+                          <a:spcPts val="0"/>
+                        </a:spcAft>
+                      </a:pPr>
+                      <a:r>
+                        <a:rPr lang="en-US" sz="800" u="sng">
+                          <a:solidFill>
+                            <a:schemeClr val="accent5">
+                              <a:lumMod val="75000"/>
+                            </a:schemeClr>
+                          </a:solidFill>
+                          <a:effectLst/>
+                          <a:hlinkClick r:id="rId2">
+                            <a:extLst>
+                              <a:ext uri="{A12FA001-AC4F-418D-AE19-62706E023703}">
+                                <ahyp:hlinkClr xmlns:ahyp="http://schemas.microsoft.com/office/drawing/2018/hyperlinkcolor" val="tx"/>
+                              </a:ext>
+                            </a:extLst>
+                          </a:hlinkClick>
+                        </a:rPr>
+                        <a:t>Circle_circle_2.png</a:t>
+                      </a:r>
+                      <a:r>
+                        <a:rPr lang="en-US" sz="800">
+                          <a:solidFill>
+                            <a:schemeClr val="accent5">
+                              <a:lumMod val="75000"/>
+                            </a:schemeClr>
+                          </a:solidFill>
+                          <a:effectLst/>
+                        </a:rPr>
+                        <a:t> </a:t>
+                      </a:r>
+                      <a:endParaRPr lang="en-US" sz="800">
+                        <a:solidFill>
+                          <a:schemeClr val="accent5">
+                            <a:lumMod val="75000"/>
+                          </a:schemeClr>
+                        </a:solidFill>
+                        <a:effectLst/>
+                        <a:latin typeface="Times New Roman" panose="02020603050405020304" pitchFamily="18" charset="0"/>
+                        <a:ea typeface="SimSun" panose="02010600030101010101" pitchFamily="2" charset="-122"/>
+                        <a:cs typeface="Times New Roman" panose="02020603050405020304" pitchFamily="18" charset="0"/>
+                      </a:endParaRPr>
+                    </a:p>
+                  </a:txBody>
+                  <a:tcPr marL="36250" marR="36250" marT="0" marB="0"/>
+                </a:tc>
+                <a:tc>
+                  <a:txBody>
+                    <a:bodyPr/>
+                    <a:lstStyle/>
+                    <a:p>
+                      <a:pPr marL="0" marR="0" algn="just">
+                        <a:lnSpc>
+                          <a:spcPct val="107000"/>
+                        </a:lnSpc>
+                        <a:spcBef>
+                          <a:spcPts val="0"/>
+                        </a:spcBef>
+                        <a:spcAft>
+                          <a:spcPts val="0"/>
+                        </a:spcAft>
+                      </a:pPr>
+                      <a:r>
+                        <a:rPr lang="en-US" sz="500">
+                          <a:effectLst/>
+                        </a:rPr>
+                        <a:t>34.85% match with Triangle_20</a:t>
+                      </a:r>
+                    </a:p>
+                    <a:p>
+                      <a:pPr marL="0" marR="0" algn="just">
+                        <a:lnSpc>
+                          <a:spcPct val="107000"/>
+                        </a:lnSpc>
+                        <a:spcBef>
+                          <a:spcPts val="0"/>
+                        </a:spcBef>
+                        <a:spcAft>
+                          <a:spcPts val="0"/>
+                        </a:spcAft>
+                      </a:pPr>
+                      <a:r>
+                        <a:rPr lang="en-US" sz="500">
+                          <a:effectLst/>
+                        </a:rPr>
+                        <a:t>32.58% match with Circle_24</a:t>
+                      </a:r>
+                    </a:p>
+                    <a:p>
+                      <a:pPr marL="0" marR="0" algn="just">
+                        <a:lnSpc>
+                          <a:spcPct val="107000"/>
+                        </a:lnSpc>
+                        <a:spcBef>
+                          <a:spcPts val="0"/>
+                        </a:spcBef>
+                        <a:spcAft>
+                          <a:spcPts val="0"/>
+                        </a:spcAft>
+                      </a:pPr>
+                      <a:r>
+                        <a:rPr lang="en-US" sz="500">
+                          <a:effectLst/>
+                        </a:rPr>
+                        <a:t>31.82% match with Circle_4</a:t>
+                      </a:r>
+                    </a:p>
+                    <a:p>
+                      <a:pPr marL="0" marR="0" algn="just">
+                        <a:lnSpc>
+                          <a:spcPct val="107000"/>
+                        </a:lnSpc>
+                        <a:spcBef>
+                          <a:spcPts val="0"/>
+                        </a:spcBef>
+                        <a:spcAft>
+                          <a:spcPts val="0"/>
+                        </a:spcAft>
+                      </a:pPr>
+                      <a:r>
+                        <a:rPr lang="en-US" sz="500">
+                          <a:effectLst/>
+                        </a:rPr>
+                        <a:t>25.76% match with Rectangle_17</a:t>
+                      </a:r>
+                    </a:p>
+                    <a:p>
+                      <a:pPr marL="0" marR="0" algn="just">
+                        <a:lnSpc>
+                          <a:spcPct val="107000"/>
+                        </a:lnSpc>
+                        <a:spcBef>
+                          <a:spcPts val="0"/>
+                        </a:spcBef>
+                        <a:spcAft>
+                          <a:spcPts val="0"/>
+                        </a:spcAft>
+                      </a:pPr>
+                      <a:r>
+                        <a:rPr lang="en-US" sz="500">
+                          <a:effectLst/>
+                        </a:rPr>
+                        <a:t>14.39% match with Triangle_28</a:t>
+                      </a:r>
+                      <a:endParaRPr lang="en-US" sz="500">
+                        <a:effectLst/>
+                        <a:latin typeface="Times New Roman" panose="02020603050405020304" pitchFamily="18" charset="0"/>
+                        <a:ea typeface="SimSun" panose="02010600030101010101" pitchFamily="2" charset="-122"/>
+                        <a:cs typeface="Times New Roman" panose="02020603050405020304" pitchFamily="18" charset="0"/>
+                      </a:endParaRPr>
+                    </a:p>
+                  </a:txBody>
+                  <a:tcPr marL="36250" marR="36250" marT="0" marB="0"/>
+                </a:tc>
+                <a:extLst>
+                  <a:ext uri="{0D108BD9-81ED-4DB2-BD59-A6C34878D82A}">
+                    <a16:rowId xmlns:a16="http://schemas.microsoft.com/office/drawing/2014/main" val="2221671375"/>
+                  </a:ext>
+                </a:extLst>
+              </a:tr>
+              <a:tr h="500516">
+                <a:tc>
+                  <a:txBody>
+                    <a:bodyPr/>
+                    <a:lstStyle/>
+                    <a:p>
+                      <a:pPr marL="0" marR="0" algn="just">
+                        <a:lnSpc>
+                          <a:spcPct val="107000"/>
+                        </a:lnSpc>
+                        <a:spcBef>
+                          <a:spcPts val="0"/>
+                        </a:spcBef>
+                        <a:spcAft>
+                          <a:spcPts val="0"/>
+                        </a:spcAft>
+                      </a:pPr>
+                      <a:r>
+                        <a:rPr lang="en-US" sz="800" u="sng">
+                          <a:solidFill>
+                            <a:schemeClr val="accent5">
+                              <a:lumMod val="75000"/>
+                            </a:schemeClr>
+                          </a:solidFill>
+                          <a:effectLst/>
+                          <a:hlinkClick r:id="rId3">
+                            <a:extLst>
+                              <a:ext uri="{A12FA001-AC4F-418D-AE19-62706E023703}">
+                                <ahyp:hlinkClr xmlns:ahyp="http://schemas.microsoft.com/office/drawing/2018/hyperlinkcolor" val="tx"/>
+                              </a:ext>
+                            </a:extLst>
+                          </a:hlinkClick>
+                        </a:rPr>
+                        <a:t>Circle_circle_3.png</a:t>
+                      </a:r>
+                      <a:endParaRPr lang="en-US" sz="800">
+                        <a:solidFill>
+                          <a:schemeClr val="accent5">
+                            <a:lumMod val="75000"/>
+                          </a:schemeClr>
+                        </a:solidFill>
+                        <a:effectLst/>
+                        <a:latin typeface="Times New Roman" panose="02020603050405020304" pitchFamily="18" charset="0"/>
+                        <a:ea typeface="SimSun" panose="02010600030101010101" pitchFamily="2" charset="-122"/>
+                        <a:cs typeface="Times New Roman" panose="02020603050405020304" pitchFamily="18" charset="0"/>
+                      </a:endParaRPr>
+                    </a:p>
+                  </a:txBody>
+                  <a:tcPr marL="36250" marR="36250" marT="0" marB="0"/>
+                </a:tc>
+                <a:tc>
+                  <a:txBody>
+                    <a:bodyPr/>
+                    <a:lstStyle/>
+                    <a:p>
+                      <a:pPr marL="0" marR="0" algn="just">
+                        <a:lnSpc>
+                          <a:spcPct val="107000"/>
+                        </a:lnSpc>
+                        <a:spcBef>
+                          <a:spcPts val="0"/>
+                        </a:spcBef>
+                        <a:spcAft>
+                          <a:spcPts val="0"/>
+                        </a:spcAft>
+                      </a:pPr>
+                      <a:r>
+                        <a:rPr lang="en-US" sz="500">
+                          <a:effectLst/>
+                        </a:rPr>
+                        <a:t>39.3% match with Triangle_21</a:t>
+                      </a:r>
+                    </a:p>
+                    <a:p>
+                      <a:pPr marL="0" marR="0" algn="just">
+                        <a:lnSpc>
+                          <a:spcPct val="107000"/>
+                        </a:lnSpc>
+                        <a:spcBef>
+                          <a:spcPts val="0"/>
+                        </a:spcBef>
+                        <a:spcAft>
+                          <a:spcPts val="0"/>
+                        </a:spcAft>
+                      </a:pPr>
+                      <a:r>
+                        <a:rPr lang="en-US" sz="500">
+                          <a:effectLst/>
+                        </a:rPr>
+                        <a:t>14.17% match with Rectangle_16</a:t>
+                      </a:r>
+                    </a:p>
+                    <a:p>
+                      <a:pPr marL="0" marR="0" algn="just">
+                        <a:lnSpc>
+                          <a:spcPct val="107000"/>
+                        </a:lnSpc>
+                        <a:spcBef>
+                          <a:spcPts val="0"/>
+                        </a:spcBef>
+                        <a:spcAft>
+                          <a:spcPts val="0"/>
+                        </a:spcAft>
+                      </a:pPr>
+                      <a:r>
+                        <a:rPr lang="en-US" sz="500">
+                          <a:effectLst/>
+                        </a:rPr>
+                        <a:t>13.9% match with Circle_2</a:t>
+                      </a:r>
+                    </a:p>
+                    <a:p>
+                      <a:pPr marL="0" marR="0" algn="just">
+                        <a:lnSpc>
+                          <a:spcPct val="107000"/>
+                        </a:lnSpc>
+                        <a:spcBef>
+                          <a:spcPts val="0"/>
+                        </a:spcBef>
+                        <a:spcAft>
+                          <a:spcPts val="0"/>
+                        </a:spcAft>
+                      </a:pPr>
+                      <a:r>
+                        <a:rPr lang="en-US" sz="500">
+                          <a:effectLst/>
+                        </a:rPr>
+                        <a:t>12.03% match with Triangle_28</a:t>
+                      </a:r>
+                    </a:p>
+                    <a:p>
+                      <a:pPr marL="0" marR="0" algn="just">
+                        <a:lnSpc>
+                          <a:spcPct val="107000"/>
+                        </a:lnSpc>
+                        <a:spcBef>
+                          <a:spcPts val="0"/>
+                        </a:spcBef>
+                        <a:spcAft>
+                          <a:spcPts val="0"/>
+                        </a:spcAft>
+                      </a:pPr>
+                      <a:r>
+                        <a:rPr lang="en-US" sz="500">
+                          <a:effectLst/>
+                        </a:rPr>
+                        <a:t>10.43% match with Circle_23</a:t>
+                      </a:r>
+                      <a:endParaRPr lang="en-US" sz="500">
+                        <a:effectLst/>
+                        <a:latin typeface="Times New Roman" panose="02020603050405020304" pitchFamily="18" charset="0"/>
+                        <a:ea typeface="SimSun" panose="02010600030101010101" pitchFamily="2" charset="-122"/>
+                        <a:cs typeface="Times New Roman" panose="02020603050405020304" pitchFamily="18" charset="0"/>
+                      </a:endParaRPr>
+                    </a:p>
+                  </a:txBody>
+                  <a:tcPr marL="36250" marR="36250" marT="0" marB="0"/>
+                </a:tc>
+                <a:extLst>
+                  <a:ext uri="{0D108BD9-81ED-4DB2-BD59-A6C34878D82A}">
+                    <a16:rowId xmlns:a16="http://schemas.microsoft.com/office/drawing/2014/main" val="1939000134"/>
+                  </a:ext>
+                </a:extLst>
+              </a:tr>
+              <a:tr h="500516">
+                <a:tc>
+                  <a:txBody>
+                    <a:bodyPr/>
+                    <a:lstStyle/>
+                    <a:p>
+                      <a:pPr marL="0" marR="0" algn="just">
+                        <a:lnSpc>
+                          <a:spcPct val="107000"/>
+                        </a:lnSpc>
+                        <a:spcBef>
+                          <a:spcPts val="0"/>
+                        </a:spcBef>
+                        <a:spcAft>
+                          <a:spcPts val="0"/>
+                        </a:spcAft>
+                      </a:pPr>
+                      <a:r>
+                        <a:rPr lang="en-US" sz="800" u="sng">
+                          <a:solidFill>
+                            <a:schemeClr val="accent5">
+                              <a:lumMod val="75000"/>
+                            </a:schemeClr>
+                          </a:solidFill>
+                          <a:effectLst/>
+                          <a:hlinkClick r:id="rId4">
+                            <a:extLst>
+                              <a:ext uri="{A12FA001-AC4F-418D-AE19-62706E023703}">
+                                <ahyp:hlinkClr xmlns:ahyp="http://schemas.microsoft.com/office/drawing/2018/hyperlinkcolor" val="tx"/>
+                              </a:ext>
+                            </a:extLst>
+                          </a:hlinkClick>
+                        </a:rPr>
+                        <a:t>Line_line_11.png</a:t>
+                      </a:r>
+                      <a:endParaRPr lang="en-US" sz="800">
+                        <a:solidFill>
+                          <a:schemeClr val="accent5">
+                            <a:lumMod val="75000"/>
+                          </a:schemeClr>
+                        </a:solidFill>
+                        <a:effectLst/>
+                        <a:latin typeface="Times New Roman" panose="02020603050405020304" pitchFamily="18" charset="0"/>
+                        <a:ea typeface="SimSun" panose="02010600030101010101" pitchFamily="2" charset="-122"/>
+                        <a:cs typeface="Times New Roman" panose="02020603050405020304" pitchFamily="18" charset="0"/>
+                      </a:endParaRPr>
+                    </a:p>
+                  </a:txBody>
+                  <a:tcPr marL="36250" marR="36250" marT="0" marB="0"/>
+                </a:tc>
+                <a:tc>
+                  <a:txBody>
+                    <a:bodyPr/>
+                    <a:lstStyle/>
+                    <a:p>
+                      <a:pPr marL="0" marR="0" algn="just">
+                        <a:lnSpc>
+                          <a:spcPct val="107000"/>
+                        </a:lnSpc>
+                        <a:spcBef>
+                          <a:spcPts val="0"/>
+                        </a:spcBef>
+                        <a:spcAft>
+                          <a:spcPts val="0"/>
+                        </a:spcAft>
+                      </a:pPr>
+                      <a:r>
+                        <a:rPr lang="en-US" sz="500">
+                          <a:effectLst/>
+                        </a:rPr>
+                        <a:t>61.24% match with Rectangle_13</a:t>
+                      </a:r>
+                    </a:p>
+                    <a:p>
+                      <a:pPr marL="0" marR="0" algn="just">
+                        <a:lnSpc>
+                          <a:spcPct val="107000"/>
+                        </a:lnSpc>
+                        <a:spcBef>
+                          <a:spcPts val="0"/>
+                        </a:spcBef>
+                        <a:spcAft>
+                          <a:spcPts val="0"/>
+                        </a:spcAft>
+                      </a:pPr>
+                      <a:r>
+                        <a:rPr lang="en-US" sz="500">
+                          <a:effectLst/>
+                        </a:rPr>
+                        <a:t>60.47% match with Reactangle_21</a:t>
+                      </a:r>
+                    </a:p>
+                    <a:p>
+                      <a:pPr marL="0" marR="0" algn="just">
+                        <a:lnSpc>
+                          <a:spcPct val="107000"/>
+                        </a:lnSpc>
+                        <a:spcBef>
+                          <a:spcPts val="0"/>
+                        </a:spcBef>
+                        <a:spcAft>
+                          <a:spcPts val="0"/>
+                        </a:spcAft>
+                      </a:pPr>
+                      <a:r>
+                        <a:rPr lang="en-US" sz="500">
+                          <a:effectLst/>
+                        </a:rPr>
+                        <a:t>21.71% match with Line_13</a:t>
+                      </a:r>
+                    </a:p>
+                    <a:p>
+                      <a:pPr marL="0" marR="0" algn="just">
+                        <a:lnSpc>
+                          <a:spcPct val="107000"/>
+                        </a:lnSpc>
+                        <a:spcBef>
+                          <a:spcPts val="0"/>
+                        </a:spcBef>
+                        <a:spcAft>
+                          <a:spcPts val="0"/>
+                        </a:spcAft>
+                      </a:pPr>
+                      <a:r>
+                        <a:rPr lang="en-US" sz="500">
+                          <a:effectLst/>
+                        </a:rPr>
+                        <a:t>19.38% match with Triangle_0</a:t>
+                      </a:r>
+                    </a:p>
+                    <a:p>
+                      <a:pPr marL="0" marR="0" algn="just">
+                        <a:lnSpc>
+                          <a:spcPct val="107000"/>
+                        </a:lnSpc>
+                        <a:spcBef>
+                          <a:spcPts val="0"/>
+                        </a:spcBef>
+                        <a:spcAft>
+                          <a:spcPts val="0"/>
+                        </a:spcAft>
+                      </a:pPr>
+                      <a:r>
+                        <a:rPr lang="en-US" sz="500">
+                          <a:effectLst/>
+                        </a:rPr>
+                        <a:t>18.6% match with Line_32</a:t>
+                      </a:r>
+                      <a:endParaRPr lang="en-US" sz="500">
+                        <a:effectLst/>
+                        <a:latin typeface="Times New Roman" panose="02020603050405020304" pitchFamily="18" charset="0"/>
+                        <a:ea typeface="SimSun" panose="02010600030101010101" pitchFamily="2" charset="-122"/>
+                        <a:cs typeface="Times New Roman" panose="02020603050405020304" pitchFamily="18" charset="0"/>
+                      </a:endParaRPr>
+                    </a:p>
+                  </a:txBody>
+                  <a:tcPr marL="36250" marR="36250" marT="0" marB="0"/>
+                </a:tc>
+                <a:extLst>
+                  <a:ext uri="{0D108BD9-81ED-4DB2-BD59-A6C34878D82A}">
+                    <a16:rowId xmlns:a16="http://schemas.microsoft.com/office/drawing/2014/main" val="4160458241"/>
+                  </a:ext>
+                </a:extLst>
+              </a:tr>
+              <a:tr h="428396">
+                <a:tc>
+                  <a:txBody>
+                    <a:bodyPr/>
+                    <a:lstStyle/>
+                    <a:p>
+                      <a:pPr marL="0" marR="0" algn="just">
+                        <a:lnSpc>
+                          <a:spcPct val="107000"/>
+                        </a:lnSpc>
+                        <a:spcBef>
+                          <a:spcPts val="0"/>
+                        </a:spcBef>
+                        <a:spcAft>
+                          <a:spcPts val="0"/>
+                        </a:spcAft>
+                      </a:pPr>
+                      <a:r>
+                        <a:rPr lang="en-US" sz="800" u="sng">
+                          <a:solidFill>
+                            <a:schemeClr val="accent5">
+                              <a:lumMod val="75000"/>
+                            </a:schemeClr>
+                          </a:solidFill>
+                          <a:effectLst/>
+                          <a:hlinkClick r:id="rId5">
+                            <a:extLst>
+                              <a:ext uri="{A12FA001-AC4F-418D-AE19-62706E023703}">
+                                <ahyp:hlinkClr xmlns:ahyp="http://schemas.microsoft.com/office/drawing/2018/hyperlinkcolor" val="tx"/>
+                              </a:ext>
+                            </a:extLst>
+                          </a:hlinkClick>
+                        </a:rPr>
+                        <a:t>Line_line_22.png</a:t>
+                      </a:r>
+                      <a:endParaRPr lang="en-US" sz="800">
+                        <a:solidFill>
+                          <a:schemeClr val="accent5">
+                            <a:lumMod val="75000"/>
+                          </a:schemeClr>
+                        </a:solidFill>
+                        <a:effectLst/>
+                        <a:latin typeface="Times New Roman" panose="02020603050405020304" pitchFamily="18" charset="0"/>
+                        <a:ea typeface="SimSun" panose="02010600030101010101" pitchFamily="2" charset="-122"/>
+                        <a:cs typeface="Times New Roman" panose="02020603050405020304" pitchFamily="18" charset="0"/>
+                      </a:endParaRPr>
+                    </a:p>
+                  </a:txBody>
+                  <a:tcPr marL="36250" marR="36250" marT="0" marB="0"/>
+                </a:tc>
+                <a:tc>
+                  <a:txBody>
+                    <a:bodyPr/>
+                    <a:lstStyle/>
+                    <a:p>
+                      <a:pPr marL="0" marR="0" algn="just">
+                        <a:lnSpc>
+                          <a:spcPct val="107000"/>
+                        </a:lnSpc>
+                        <a:spcBef>
+                          <a:spcPts val="0"/>
+                        </a:spcBef>
+                        <a:spcAft>
+                          <a:spcPts val="0"/>
+                        </a:spcAft>
+                      </a:pPr>
+                      <a:r>
+                        <a:rPr lang="en-US" sz="500">
+                          <a:effectLst/>
+                        </a:rPr>
+                        <a:t>18.63% match with Triangle_29</a:t>
+                      </a:r>
+                    </a:p>
+                    <a:p>
+                      <a:pPr marL="0" marR="0" algn="just">
+                        <a:lnSpc>
+                          <a:spcPct val="107000"/>
+                        </a:lnSpc>
+                        <a:spcBef>
+                          <a:spcPts val="0"/>
+                        </a:spcBef>
+                        <a:spcAft>
+                          <a:spcPts val="0"/>
+                        </a:spcAft>
+                      </a:pPr>
+                      <a:r>
+                        <a:rPr lang="en-US" sz="500">
+                          <a:effectLst/>
+                        </a:rPr>
+                        <a:t>7.14% match with Triangle_28</a:t>
+                      </a:r>
+                    </a:p>
+                    <a:p>
+                      <a:pPr marL="0" marR="0" algn="just">
+                        <a:lnSpc>
+                          <a:spcPct val="107000"/>
+                        </a:lnSpc>
+                        <a:spcBef>
+                          <a:spcPts val="0"/>
+                        </a:spcBef>
+                        <a:spcAft>
+                          <a:spcPts val="0"/>
+                        </a:spcAft>
+                      </a:pPr>
+                      <a:r>
+                        <a:rPr lang="en-US" sz="500">
+                          <a:effectLst/>
+                        </a:rPr>
+                        <a:t>4.9% match with Line_24</a:t>
+                      </a:r>
+                    </a:p>
+                    <a:p>
+                      <a:pPr marL="0" marR="0" algn="just">
+                        <a:lnSpc>
+                          <a:spcPct val="107000"/>
+                        </a:lnSpc>
+                        <a:spcBef>
+                          <a:spcPts val="0"/>
+                        </a:spcBef>
+                        <a:spcAft>
+                          <a:spcPts val="0"/>
+                        </a:spcAft>
+                      </a:pPr>
+                      <a:r>
+                        <a:rPr lang="en-US" sz="500">
+                          <a:effectLst/>
+                        </a:rPr>
+                        <a:t>4.9% match with Line_42</a:t>
+                      </a:r>
+                    </a:p>
+                    <a:p>
+                      <a:pPr marL="0" marR="0" algn="just">
+                        <a:lnSpc>
+                          <a:spcPct val="107000"/>
+                        </a:lnSpc>
+                        <a:spcBef>
+                          <a:spcPts val="0"/>
+                        </a:spcBef>
+                        <a:spcAft>
+                          <a:spcPts val="0"/>
+                        </a:spcAft>
+                      </a:pPr>
+                      <a:r>
+                        <a:rPr lang="en-US" sz="500">
+                          <a:effectLst/>
+                        </a:rPr>
+                        <a:t>3.92% match with Line_5</a:t>
+                      </a:r>
+                      <a:endParaRPr lang="en-US" sz="500">
+                        <a:effectLst/>
+                        <a:latin typeface="Times New Roman" panose="02020603050405020304" pitchFamily="18" charset="0"/>
+                        <a:ea typeface="SimSun" panose="02010600030101010101" pitchFamily="2" charset="-122"/>
+                        <a:cs typeface="Times New Roman" panose="02020603050405020304" pitchFamily="18" charset="0"/>
+                      </a:endParaRPr>
+                    </a:p>
+                  </a:txBody>
+                  <a:tcPr marL="36250" marR="36250" marT="0" marB="0"/>
+                </a:tc>
+                <a:extLst>
+                  <a:ext uri="{0D108BD9-81ED-4DB2-BD59-A6C34878D82A}">
+                    <a16:rowId xmlns:a16="http://schemas.microsoft.com/office/drawing/2014/main" val="2730381182"/>
+                  </a:ext>
+                </a:extLst>
+              </a:tr>
+              <a:tr h="500516">
+                <a:tc>
+                  <a:txBody>
+                    <a:bodyPr/>
+                    <a:lstStyle/>
+                    <a:p>
+                      <a:pPr marL="0" marR="0" algn="just">
+                        <a:lnSpc>
+                          <a:spcPct val="107000"/>
+                        </a:lnSpc>
+                        <a:spcBef>
+                          <a:spcPts val="0"/>
+                        </a:spcBef>
+                        <a:spcAft>
+                          <a:spcPts val="0"/>
+                        </a:spcAft>
+                      </a:pPr>
+                      <a:r>
+                        <a:rPr lang="en-US" sz="800" u="sng">
+                          <a:solidFill>
+                            <a:schemeClr val="accent5">
+                              <a:lumMod val="75000"/>
+                            </a:schemeClr>
+                          </a:solidFill>
+                          <a:effectLst/>
+                          <a:hlinkClick r:id="rId6">
+                            <a:extLst>
+                              <a:ext uri="{A12FA001-AC4F-418D-AE19-62706E023703}">
+                                <ahyp:hlinkClr xmlns:ahyp="http://schemas.microsoft.com/office/drawing/2018/hyperlinkcolor" val="tx"/>
+                              </a:ext>
+                            </a:extLst>
+                          </a:hlinkClick>
+                        </a:rPr>
+                        <a:t>Rectangle_rectangle_18.png</a:t>
+                      </a:r>
+                      <a:r>
+                        <a:rPr lang="en-US" sz="800">
+                          <a:solidFill>
+                            <a:schemeClr val="accent5">
+                              <a:lumMod val="75000"/>
+                            </a:schemeClr>
+                          </a:solidFill>
+                          <a:effectLst/>
+                        </a:rPr>
+                        <a:t> </a:t>
+                      </a:r>
+                      <a:endParaRPr lang="en-US" sz="800">
+                        <a:solidFill>
+                          <a:schemeClr val="accent5">
+                            <a:lumMod val="75000"/>
+                          </a:schemeClr>
+                        </a:solidFill>
+                        <a:effectLst/>
+                        <a:latin typeface="Times New Roman" panose="02020603050405020304" pitchFamily="18" charset="0"/>
+                        <a:ea typeface="SimSun" panose="02010600030101010101" pitchFamily="2" charset="-122"/>
+                        <a:cs typeface="Times New Roman" panose="02020603050405020304" pitchFamily="18" charset="0"/>
+                      </a:endParaRPr>
+                    </a:p>
+                  </a:txBody>
+                  <a:tcPr marL="36250" marR="36250" marT="0" marB="0"/>
+                </a:tc>
+                <a:tc>
+                  <a:txBody>
+                    <a:bodyPr/>
+                    <a:lstStyle/>
+                    <a:p>
+                      <a:pPr marL="0" marR="0" algn="just">
+                        <a:lnSpc>
+                          <a:spcPct val="107000"/>
+                        </a:lnSpc>
+                        <a:spcBef>
+                          <a:spcPts val="0"/>
+                        </a:spcBef>
+                        <a:spcAft>
+                          <a:spcPts val="0"/>
+                        </a:spcAft>
+                      </a:pPr>
+                      <a:r>
+                        <a:rPr lang="en-US" sz="500">
+                          <a:effectLst/>
+                        </a:rPr>
+                        <a:t>20.55% match with Triangle_35</a:t>
+                      </a:r>
+                    </a:p>
+                    <a:p>
+                      <a:pPr marL="0" marR="0" algn="just">
+                        <a:lnSpc>
+                          <a:spcPct val="107000"/>
+                        </a:lnSpc>
+                        <a:spcBef>
+                          <a:spcPts val="0"/>
+                        </a:spcBef>
+                        <a:spcAft>
+                          <a:spcPts val="0"/>
+                        </a:spcAft>
+                      </a:pPr>
+                      <a:r>
+                        <a:rPr lang="en-US" sz="500">
+                          <a:effectLst/>
+                        </a:rPr>
+                        <a:t>14.68% match with Triangle_11</a:t>
+                      </a:r>
+                    </a:p>
+                    <a:p>
+                      <a:pPr marL="0" marR="0" algn="just">
+                        <a:lnSpc>
+                          <a:spcPct val="107000"/>
+                        </a:lnSpc>
+                        <a:spcBef>
+                          <a:spcPts val="0"/>
+                        </a:spcBef>
+                        <a:spcAft>
+                          <a:spcPts val="0"/>
+                        </a:spcAft>
+                      </a:pPr>
+                      <a:r>
+                        <a:rPr lang="en-US" sz="500">
+                          <a:effectLst/>
+                        </a:rPr>
+                        <a:t>4.9% match with Triangle_34</a:t>
+                      </a:r>
+                    </a:p>
+                    <a:p>
+                      <a:pPr marL="0" marR="0" algn="just">
+                        <a:lnSpc>
+                          <a:spcPct val="107000"/>
+                        </a:lnSpc>
+                        <a:spcBef>
+                          <a:spcPts val="0"/>
+                        </a:spcBef>
+                        <a:spcAft>
+                          <a:spcPts val="0"/>
+                        </a:spcAft>
+                      </a:pPr>
+                      <a:r>
+                        <a:rPr lang="en-US" sz="500">
+                          <a:effectLst/>
+                        </a:rPr>
+                        <a:t>4.35% match with Triangle_12</a:t>
+                      </a:r>
+                    </a:p>
+                    <a:p>
+                      <a:pPr marL="0" marR="0" algn="just">
+                        <a:lnSpc>
+                          <a:spcPct val="107000"/>
+                        </a:lnSpc>
+                        <a:spcBef>
+                          <a:spcPts val="0"/>
+                        </a:spcBef>
+                        <a:spcAft>
+                          <a:spcPts val="0"/>
+                        </a:spcAft>
+                      </a:pPr>
+                      <a:r>
+                        <a:rPr lang="en-US" sz="500">
+                          <a:effectLst/>
+                        </a:rPr>
+                        <a:t>2.94% match with Triangle_3</a:t>
+                      </a:r>
+                      <a:endParaRPr lang="en-US" sz="500">
+                        <a:effectLst/>
+                        <a:latin typeface="Times New Roman" panose="02020603050405020304" pitchFamily="18" charset="0"/>
+                        <a:ea typeface="SimSun" panose="02010600030101010101" pitchFamily="2" charset="-122"/>
+                        <a:cs typeface="Times New Roman" panose="02020603050405020304" pitchFamily="18" charset="0"/>
+                      </a:endParaRPr>
+                    </a:p>
+                  </a:txBody>
+                  <a:tcPr marL="36250" marR="36250" marT="0" marB="0"/>
+                </a:tc>
+                <a:extLst>
+                  <a:ext uri="{0D108BD9-81ED-4DB2-BD59-A6C34878D82A}">
+                    <a16:rowId xmlns:a16="http://schemas.microsoft.com/office/drawing/2014/main" val="862696799"/>
+                  </a:ext>
+                </a:extLst>
+              </a:tr>
+              <a:tr h="644755">
+                <a:tc>
+                  <a:txBody>
+                    <a:bodyPr/>
+                    <a:lstStyle/>
+                    <a:p>
+                      <a:pPr marL="0" marR="0" algn="just">
+                        <a:lnSpc>
+                          <a:spcPct val="107000"/>
+                        </a:lnSpc>
+                        <a:spcBef>
+                          <a:spcPts val="0"/>
+                        </a:spcBef>
+                        <a:spcAft>
+                          <a:spcPts val="0"/>
+                        </a:spcAft>
+                      </a:pPr>
+                      <a:r>
+                        <a:rPr lang="en-US" sz="800" u="sng">
+                          <a:solidFill>
+                            <a:schemeClr val="accent5">
+                              <a:lumMod val="75000"/>
+                            </a:schemeClr>
+                          </a:solidFill>
+                          <a:effectLst/>
+                          <a:hlinkClick r:id="rId7">
+                            <a:extLst>
+                              <a:ext uri="{A12FA001-AC4F-418D-AE19-62706E023703}">
+                                <ahyp:hlinkClr xmlns:ahyp="http://schemas.microsoft.com/office/drawing/2018/hyperlinkcolor" val="tx"/>
+                              </a:ext>
+                            </a:extLst>
+                          </a:hlinkClick>
+                        </a:rPr>
+                        <a:t>Rectangle_rectangle_28.png</a:t>
+                      </a:r>
+                      <a:endParaRPr lang="en-US" sz="800">
+                        <a:solidFill>
+                          <a:schemeClr val="accent5">
+                            <a:lumMod val="75000"/>
+                          </a:schemeClr>
+                        </a:solidFill>
+                        <a:effectLst/>
+                        <a:latin typeface="Times New Roman" panose="02020603050405020304" pitchFamily="18" charset="0"/>
+                        <a:ea typeface="SimSun" panose="02010600030101010101" pitchFamily="2" charset="-122"/>
+                        <a:cs typeface="Times New Roman" panose="02020603050405020304" pitchFamily="18" charset="0"/>
+                      </a:endParaRPr>
+                    </a:p>
+                  </a:txBody>
+                  <a:tcPr marL="36250" marR="36250" marT="0" marB="0"/>
+                </a:tc>
+                <a:tc>
+                  <a:txBody>
+                    <a:bodyPr/>
+                    <a:lstStyle/>
+                    <a:p>
+                      <a:pPr marL="0" marR="0" algn="just">
+                        <a:lnSpc>
+                          <a:spcPct val="107000"/>
+                        </a:lnSpc>
+                        <a:spcBef>
+                          <a:spcPts val="0"/>
+                        </a:spcBef>
+                        <a:spcAft>
+                          <a:spcPts val="0"/>
+                        </a:spcAft>
+                      </a:pPr>
+                      <a:r>
+                        <a:rPr lang="en-US" sz="500">
+                          <a:effectLst/>
+                        </a:rPr>
+                        <a:t>27.78% match with Triangle_6</a:t>
+                      </a:r>
+                    </a:p>
+                    <a:p>
+                      <a:pPr marL="0" marR="0" algn="just">
+                        <a:lnSpc>
+                          <a:spcPct val="107000"/>
+                        </a:lnSpc>
+                        <a:spcBef>
+                          <a:spcPts val="0"/>
+                        </a:spcBef>
+                        <a:spcAft>
+                          <a:spcPts val="0"/>
+                        </a:spcAft>
+                      </a:pPr>
+                      <a:r>
+                        <a:rPr lang="en-US" sz="500">
+                          <a:effectLst/>
+                        </a:rPr>
+                        <a:t>21.96% match with Triangle_33</a:t>
+                      </a:r>
+                    </a:p>
+                    <a:p>
+                      <a:pPr marL="0" marR="0" algn="just">
+                        <a:lnSpc>
+                          <a:spcPct val="107000"/>
+                        </a:lnSpc>
+                        <a:spcBef>
+                          <a:spcPts val="0"/>
+                        </a:spcBef>
+                        <a:spcAft>
+                          <a:spcPts val="0"/>
+                        </a:spcAft>
+                      </a:pPr>
+                      <a:r>
+                        <a:rPr lang="en-US" sz="500">
+                          <a:effectLst/>
+                        </a:rPr>
+                        <a:t>14.81% match with Rectangle_28</a:t>
+                      </a:r>
+                    </a:p>
+                    <a:p>
+                      <a:pPr marL="0" marR="0" algn="just">
+                        <a:lnSpc>
+                          <a:spcPct val="107000"/>
+                        </a:lnSpc>
+                        <a:spcBef>
+                          <a:spcPts val="0"/>
+                        </a:spcBef>
+                        <a:spcAft>
+                          <a:spcPts val="0"/>
+                        </a:spcAft>
+                      </a:pPr>
+                      <a:r>
+                        <a:rPr lang="en-US" sz="500">
+                          <a:effectLst/>
+                        </a:rPr>
+                        <a:t>12.96% match with Rectangle_4</a:t>
+                      </a:r>
+                    </a:p>
+                    <a:p>
+                      <a:pPr marL="0" marR="0" algn="just">
+                        <a:lnSpc>
+                          <a:spcPct val="107000"/>
+                        </a:lnSpc>
+                        <a:spcBef>
+                          <a:spcPts val="0"/>
+                        </a:spcBef>
+                        <a:spcAft>
+                          <a:spcPts val="0"/>
+                        </a:spcAft>
+                      </a:pPr>
+                      <a:r>
+                        <a:rPr lang="en-US" sz="500">
+                          <a:effectLst/>
+                        </a:rPr>
+                        <a:t>11.38% match with Triangle_34</a:t>
+                      </a:r>
+                      <a:endParaRPr lang="en-US" sz="500">
+                        <a:effectLst/>
+                        <a:latin typeface="Times New Roman" panose="02020603050405020304" pitchFamily="18" charset="0"/>
+                        <a:ea typeface="SimSun" panose="02010600030101010101" pitchFamily="2" charset="-122"/>
+                        <a:cs typeface="Times New Roman" panose="02020603050405020304" pitchFamily="18" charset="0"/>
+                      </a:endParaRPr>
+                    </a:p>
+                  </a:txBody>
+                  <a:tcPr marL="36250" marR="36250" marT="0" marB="0"/>
+                </a:tc>
+                <a:extLst>
+                  <a:ext uri="{0D108BD9-81ED-4DB2-BD59-A6C34878D82A}">
+                    <a16:rowId xmlns:a16="http://schemas.microsoft.com/office/drawing/2014/main" val="3641039783"/>
+                  </a:ext>
+                </a:extLst>
+              </a:tr>
+              <a:tr h="572635">
+                <a:tc>
+                  <a:txBody>
+                    <a:bodyPr/>
+                    <a:lstStyle/>
+                    <a:p>
+                      <a:pPr marL="0" marR="0" algn="just">
+                        <a:lnSpc>
+                          <a:spcPct val="107000"/>
+                        </a:lnSpc>
+                        <a:spcBef>
+                          <a:spcPts val="0"/>
+                        </a:spcBef>
+                        <a:spcAft>
+                          <a:spcPts val="0"/>
+                        </a:spcAft>
+                      </a:pPr>
+                      <a:r>
+                        <a:rPr lang="en-US" sz="800" u="sng">
+                          <a:solidFill>
+                            <a:schemeClr val="accent5">
+                              <a:lumMod val="75000"/>
+                            </a:schemeClr>
+                          </a:solidFill>
+                          <a:effectLst/>
+                          <a:hlinkClick r:id="rId8">
+                            <a:extLst>
+                              <a:ext uri="{A12FA001-AC4F-418D-AE19-62706E023703}">
+                                <ahyp:hlinkClr xmlns:ahyp="http://schemas.microsoft.com/office/drawing/2018/hyperlinkcolor" val="tx"/>
+                              </a:ext>
+                            </a:extLst>
+                          </a:hlinkClick>
+                        </a:rPr>
+                        <a:t>Triangle_triangle_23.png</a:t>
+                      </a:r>
+                      <a:endParaRPr lang="en-US" sz="800">
+                        <a:solidFill>
+                          <a:schemeClr val="accent5">
+                            <a:lumMod val="75000"/>
+                          </a:schemeClr>
+                        </a:solidFill>
+                        <a:effectLst/>
+                        <a:latin typeface="Times New Roman" panose="02020603050405020304" pitchFamily="18" charset="0"/>
+                        <a:ea typeface="SimSun" panose="02010600030101010101" pitchFamily="2" charset="-122"/>
+                        <a:cs typeface="Times New Roman" panose="02020603050405020304" pitchFamily="18" charset="0"/>
+                      </a:endParaRPr>
+                    </a:p>
+                  </a:txBody>
+                  <a:tcPr marL="36250" marR="36250" marT="0" marB="0"/>
+                </a:tc>
+                <a:tc>
+                  <a:txBody>
+                    <a:bodyPr/>
+                    <a:lstStyle/>
+                    <a:p>
+                      <a:pPr marL="0" marR="0" algn="just">
+                        <a:lnSpc>
+                          <a:spcPct val="107000"/>
+                        </a:lnSpc>
+                        <a:spcBef>
+                          <a:spcPts val="0"/>
+                        </a:spcBef>
+                        <a:spcAft>
+                          <a:spcPts val="0"/>
+                        </a:spcAft>
+                      </a:pPr>
+                      <a:r>
+                        <a:rPr lang="en-US" sz="500">
+                          <a:effectLst/>
+                        </a:rPr>
+                        <a:t>91.45% match with Triangle_2</a:t>
+                      </a:r>
+                    </a:p>
+                    <a:p>
+                      <a:pPr marL="0" marR="0" algn="just">
+                        <a:lnSpc>
+                          <a:spcPct val="107000"/>
+                        </a:lnSpc>
+                        <a:spcBef>
+                          <a:spcPts val="0"/>
+                        </a:spcBef>
+                        <a:spcAft>
+                          <a:spcPts val="0"/>
+                        </a:spcAft>
+                      </a:pPr>
+                      <a:r>
+                        <a:rPr lang="en-US" sz="500">
+                          <a:effectLst/>
+                        </a:rPr>
+                        <a:t>16.67% match with Triangle_14</a:t>
+                      </a:r>
+                    </a:p>
+                    <a:p>
+                      <a:pPr marL="0" marR="0" algn="just">
+                        <a:lnSpc>
+                          <a:spcPct val="107000"/>
+                        </a:lnSpc>
+                        <a:spcBef>
+                          <a:spcPts val="0"/>
+                        </a:spcBef>
+                        <a:spcAft>
+                          <a:spcPts val="0"/>
+                        </a:spcAft>
+                      </a:pPr>
+                      <a:r>
+                        <a:rPr lang="en-US" sz="500">
+                          <a:effectLst/>
+                        </a:rPr>
+                        <a:t>14.53% match with Triangle_30</a:t>
+                      </a:r>
+                    </a:p>
+                    <a:p>
+                      <a:pPr marL="0" marR="0" algn="just">
+                        <a:lnSpc>
+                          <a:spcPct val="107000"/>
+                        </a:lnSpc>
+                        <a:spcBef>
+                          <a:spcPts val="0"/>
+                        </a:spcBef>
+                        <a:spcAft>
+                          <a:spcPts val="0"/>
+                        </a:spcAft>
+                      </a:pPr>
+                      <a:r>
+                        <a:rPr lang="en-US" sz="500">
+                          <a:effectLst/>
+                        </a:rPr>
+                        <a:t>13.68% match with Triangle_3</a:t>
+                      </a:r>
+                    </a:p>
+                    <a:p>
+                      <a:pPr marL="0" marR="0" algn="just">
+                        <a:lnSpc>
+                          <a:spcPct val="107000"/>
+                        </a:lnSpc>
+                        <a:spcBef>
+                          <a:spcPts val="0"/>
+                        </a:spcBef>
+                        <a:spcAft>
+                          <a:spcPts val="0"/>
+                        </a:spcAft>
+                      </a:pPr>
+                      <a:r>
+                        <a:rPr lang="en-US" sz="500">
+                          <a:effectLst/>
+                        </a:rPr>
+                        <a:t>10.26% match with Rectangle_19</a:t>
+                      </a:r>
+                      <a:endParaRPr lang="en-US" sz="500">
+                        <a:effectLst/>
+                        <a:latin typeface="Times New Roman" panose="02020603050405020304" pitchFamily="18" charset="0"/>
+                        <a:ea typeface="SimSun" panose="02010600030101010101" pitchFamily="2" charset="-122"/>
+                        <a:cs typeface="Times New Roman" panose="02020603050405020304" pitchFamily="18" charset="0"/>
+                      </a:endParaRPr>
+                    </a:p>
+                  </a:txBody>
+                  <a:tcPr marL="36250" marR="36250" marT="0" marB="0"/>
+                </a:tc>
+                <a:extLst>
+                  <a:ext uri="{0D108BD9-81ED-4DB2-BD59-A6C34878D82A}">
+                    <a16:rowId xmlns:a16="http://schemas.microsoft.com/office/drawing/2014/main" val="629505450"/>
+                  </a:ext>
+                </a:extLst>
+              </a:tr>
+              <a:tr h="644755">
+                <a:tc>
+                  <a:txBody>
+                    <a:bodyPr/>
+                    <a:lstStyle/>
+                    <a:p>
+                      <a:pPr marL="0" marR="0" algn="just">
+                        <a:lnSpc>
+                          <a:spcPct val="107000"/>
+                        </a:lnSpc>
+                        <a:spcBef>
+                          <a:spcPts val="0"/>
+                        </a:spcBef>
+                        <a:spcAft>
+                          <a:spcPts val="0"/>
+                        </a:spcAft>
+                      </a:pPr>
+                      <a:r>
+                        <a:rPr lang="en-US" sz="800" u="sng" dirty="0">
+                          <a:solidFill>
+                            <a:schemeClr val="accent5">
+                              <a:lumMod val="75000"/>
+                            </a:schemeClr>
+                          </a:solidFill>
+                          <a:effectLst/>
+                          <a:hlinkClick r:id="rId9">
+                            <a:extLst>
+                              <a:ext uri="{A12FA001-AC4F-418D-AE19-62706E023703}">
+                                <ahyp:hlinkClr xmlns:ahyp="http://schemas.microsoft.com/office/drawing/2018/hyperlinkcolor" val="tx"/>
+                              </a:ext>
+                            </a:extLst>
+                          </a:hlinkClick>
+                        </a:rPr>
+                        <a:t>Triangle_triangle_0.png</a:t>
+                      </a:r>
+                      <a:endParaRPr lang="en-US" sz="800" dirty="0">
+                        <a:solidFill>
+                          <a:schemeClr val="accent5">
+                            <a:lumMod val="75000"/>
+                          </a:schemeClr>
+                        </a:solidFill>
+                        <a:effectLst/>
+                        <a:latin typeface="Times New Roman" panose="02020603050405020304" pitchFamily="18" charset="0"/>
+                        <a:ea typeface="SimSun" panose="02010600030101010101" pitchFamily="2" charset="-122"/>
+                        <a:cs typeface="Times New Roman" panose="02020603050405020304" pitchFamily="18" charset="0"/>
+                      </a:endParaRPr>
+                    </a:p>
+                  </a:txBody>
+                  <a:tcPr marL="36250" marR="36250" marT="0" marB="0"/>
+                </a:tc>
+                <a:tc>
+                  <a:txBody>
+                    <a:bodyPr/>
+                    <a:lstStyle/>
+                    <a:p>
+                      <a:pPr marL="0" marR="0" algn="just">
+                        <a:lnSpc>
+                          <a:spcPct val="107000"/>
+                        </a:lnSpc>
+                        <a:spcBef>
+                          <a:spcPts val="0"/>
+                        </a:spcBef>
+                        <a:spcAft>
+                          <a:spcPts val="0"/>
+                        </a:spcAft>
+                      </a:pPr>
+                      <a:r>
+                        <a:rPr lang="en-US" sz="500" dirty="0">
+                          <a:effectLst/>
+                        </a:rPr>
+                        <a:t>32.13% match with Triangle_23</a:t>
+                      </a:r>
+                    </a:p>
+                    <a:p>
+                      <a:pPr marL="0" marR="0" algn="just">
+                        <a:lnSpc>
+                          <a:spcPct val="107000"/>
+                        </a:lnSpc>
+                        <a:spcBef>
+                          <a:spcPts val="0"/>
+                        </a:spcBef>
+                        <a:spcAft>
+                          <a:spcPts val="0"/>
+                        </a:spcAft>
+                      </a:pPr>
+                      <a:r>
+                        <a:rPr lang="en-US" sz="500" dirty="0">
+                          <a:effectLst/>
+                        </a:rPr>
+                        <a:t>29.72% match with Triangle_24</a:t>
+                      </a:r>
+                    </a:p>
+                    <a:p>
+                      <a:pPr marL="0" marR="0" algn="just">
+                        <a:lnSpc>
+                          <a:spcPct val="107000"/>
+                        </a:lnSpc>
+                        <a:spcBef>
+                          <a:spcPts val="0"/>
+                        </a:spcBef>
+                        <a:spcAft>
+                          <a:spcPts val="0"/>
+                        </a:spcAft>
+                      </a:pPr>
+                      <a:r>
+                        <a:rPr lang="en-US" sz="500" dirty="0">
+                          <a:effectLst/>
+                        </a:rPr>
+                        <a:t>26.51% match with Triangle_25</a:t>
+                      </a:r>
+                    </a:p>
+                    <a:p>
+                      <a:pPr marL="0" marR="0" algn="just">
+                        <a:lnSpc>
+                          <a:spcPct val="107000"/>
+                        </a:lnSpc>
+                        <a:spcBef>
+                          <a:spcPts val="0"/>
+                        </a:spcBef>
+                        <a:spcAft>
+                          <a:spcPts val="0"/>
+                        </a:spcAft>
+                      </a:pPr>
+                      <a:r>
+                        <a:rPr lang="en-US" sz="500" dirty="0">
+                          <a:effectLst/>
+                        </a:rPr>
+                        <a:t>4.42% match with Rectangle_33</a:t>
+                      </a:r>
+                    </a:p>
+                    <a:p>
+                      <a:pPr marL="0" marR="0" algn="just">
+                        <a:lnSpc>
+                          <a:spcPct val="107000"/>
+                        </a:lnSpc>
+                        <a:spcBef>
+                          <a:spcPts val="0"/>
+                        </a:spcBef>
+                        <a:spcAft>
+                          <a:spcPts val="0"/>
+                        </a:spcAft>
+                      </a:pPr>
+                      <a:r>
+                        <a:rPr lang="en-US" sz="500" dirty="0">
+                          <a:effectLst/>
+                        </a:rPr>
+                        <a:t>3.61% match with Triangle_22</a:t>
+                      </a:r>
+                      <a:endParaRPr lang="en-US" sz="500" dirty="0">
+                        <a:effectLst/>
+                        <a:latin typeface="Times New Roman" panose="02020603050405020304" pitchFamily="18" charset="0"/>
+                        <a:ea typeface="SimSun" panose="02010600030101010101" pitchFamily="2" charset="-122"/>
+                        <a:cs typeface="Times New Roman" panose="02020603050405020304" pitchFamily="18" charset="0"/>
+                      </a:endParaRPr>
+                    </a:p>
+                  </a:txBody>
+                  <a:tcPr marL="36250" marR="36250" marT="0" marB="0"/>
+                </a:tc>
+                <a:extLst>
+                  <a:ext uri="{0D108BD9-81ED-4DB2-BD59-A6C34878D82A}">
+                    <a16:rowId xmlns:a16="http://schemas.microsoft.com/office/drawing/2014/main" val="3143009573"/>
+                  </a:ext>
+                </a:extLst>
+              </a:tr>
+            </a:tbl>
+          </a:graphicData>
+        </a:graphic>
+      </p:graphicFrame>
+    </p:spTree>
+    <p:extLst>
+      <p:ext uri="{BB962C8B-B14F-4D97-AF65-F5344CB8AC3E}">
+        <p14:creationId xmlns:p14="http://schemas.microsoft.com/office/powerpoint/2010/main" val="3532033280"/>
+      </p:ext>
+    </p:extLst>
+  </p:cSld>
+  <p:clrMapOvr>
+    <a:masterClrMapping/>
+  </p:clrMapOvr>
+</p:sld>
+</file>
+
+<file path=ppt/slides/slide23.xml><?xml version="1.0" encoding="utf-8"?>
 <p:sld xmlns:a="http://schemas.openxmlformats.org/drawingml/2006/main" xmlns:r="http://schemas.openxmlformats.org/officeDocument/2006/relationships" xmlns:p="http://schemas.openxmlformats.org/presentationml/2006/main">
   <p:cSld>
     <p:spTree>
@@ -15894,20 +18876,20 @@
 </file>
 
 <file path=customXml/item1.xml><?xml version="1.0" encoding="utf-8"?>
-<p:properties xmlns:p="http://schemas.microsoft.com/office/2006/metadata/properties" xmlns:xsi="http://www.w3.org/2001/XMLSchema-instance" xmlns:pc="http://schemas.microsoft.com/office/infopath/2007/PartnerControls">
-  <documentManagement>
-    <MediaServiceKeyPoints xmlns="b7983179-1a8f-4e63-90f1-2900d4438f45" xsi:nil="true"/>
-  </documentManagement>
-</p:properties>
-</file>
-
-<file path=customXml/item2.xml><?xml version="1.0" encoding="utf-8"?>
 <?mso-contentType ?>
 <FormTemplates xmlns="http://schemas.microsoft.com/sharepoint/v3/contenttype/forms">
   <Display>DocumentLibraryForm</Display>
   <Edit>DocumentLibraryForm</Edit>
   <New>DocumentLibraryForm</New>
 </FormTemplates>
+</file>
+
+<file path=customXml/item2.xml><?xml version="1.0" encoding="utf-8"?>
+<p:properties xmlns:p="http://schemas.microsoft.com/office/2006/metadata/properties" xmlns:xsi="http://www.w3.org/2001/XMLSchema-instance" xmlns:pc="http://schemas.microsoft.com/office/infopath/2007/PartnerControls">
+  <documentManagement>
+    <MediaServiceKeyPoints xmlns="b7983179-1a8f-4e63-90f1-2900d4438f45" xsi:nil="true"/>
+  </documentManagement>
+</p:properties>
 </file>
 
 <file path=customXml/item3.xml><?xml version="1.0" encoding="utf-8"?>
@@ -16057,6 +19039,14 @@
 </file>
 
 <file path=customXml/itemProps1.xml><?xml version="1.0" encoding="utf-8"?>
+<ds:datastoreItem xmlns:ds="http://schemas.openxmlformats.org/officeDocument/2006/customXml" ds:itemID="{5CF4B188-9E41-4609-81DC-EA2587D009AE}">
+  <ds:schemaRefs>
+    <ds:schemaRef ds:uri="http://schemas.microsoft.com/sharepoint/v3/contenttype/forms"/>
+  </ds:schemaRefs>
+</ds:datastoreItem>
+</file>
+
+<file path=customXml/itemProps2.xml><?xml version="1.0" encoding="utf-8"?>
 <ds:datastoreItem xmlns:ds="http://schemas.openxmlformats.org/officeDocument/2006/customXml" ds:itemID="{DAAFE2A1-77F8-441E-9B9F-DD61C354F4FE}">
   <ds:schemaRefs>
     <ds:schemaRef ds:uri="http://purl.org/dc/terms/"/>
@@ -16068,14 +19058,6 @@
     <ds:schemaRef ds:uri="b7983179-1a8f-4e63-90f1-2900d4438f45"/>
     <ds:schemaRef ds:uri="http://www.w3.org/XML/1998/namespace"/>
     <ds:schemaRef ds:uri="http://purl.org/dc/dcmitype/"/>
-  </ds:schemaRefs>
-</ds:datastoreItem>
-</file>
-
-<file path=customXml/itemProps2.xml><?xml version="1.0" encoding="utf-8"?>
-<ds:datastoreItem xmlns:ds="http://schemas.openxmlformats.org/officeDocument/2006/customXml" ds:itemID="{5CF4B188-9E41-4609-81DC-EA2587D009AE}">
-  <ds:schemaRefs>
-    <ds:schemaRef ds:uri="http://schemas.microsoft.com/sharepoint/v3/contenttype/forms"/>
   </ds:schemaRefs>
 </ds:datastoreItem>
 </file>

</xml_diff>